<commit_message>
Added analysis for weeks 20 and 22
</commit_message>
<xml_diff>
--- a/docs/skin_uvb_tumors_v1.pptx
+++ b/docs/skin_uvb_tumors_v1.pptx
@@ -5,15 +5,20 @@
     <p:sldMasterId id="2147483648" r:id="rId1"/>
   </p:sldMasterIdLst>
   <p:notesMasterIdLst>
-    <p:notesMasterId r:id="rId8"/>
+    <p:notesMasterId r:id="rId13"/>
   </p:notesMasterIdLst>
   <p:sldIdLst>
     <p:sldId id="256" r:id="rId2"/>
     <p:sldId id="257" r:id="rId3"/>
     <p:sldId id="258" r:id="rId4"/>
-    <p:sldId id="259" r:id="rId5"/>
-    <p:sldId id="260" r:id="rId6"/>
-    <p:sldId id="261" r:id="rId7"/>
+    <p:sldId id="263" r:id="rId5"/>
+    <p:sldId id="264" r:id="rId6"/>
+    <p:sldId id="259" r:id="rId7"/>
+    <p:sldId id="260" r:id="rId8"/>
+    <p:sldId id="265" r:id="rId9"/>
+    <p:sldId id="266" r:id="rId10"/>
+    <p:sldId id="261" r:id="rId11"/>
+    <p:sldId id="262" r:id="rId12"/>
   </p:sldIdLst>
   <p:sldSz cx="12192000" cy="6858000"/>
   <p:notesSz cx="6858000" cy="9144000"/>
@@ -112,6 +117,11 @@
       </a:defRPr>
     </a:lvl9pPr>
   </p:defaultTextStyle>
+  <p:extLst>
+    <p:ext uri="{EFAFB233-063F-42B5-8137-9DF3F51BA10A}">
+      <p15:sldGuideLst xmlns:p15="http://schemas.microsoft.com/office/powerpoint/2012/main"/>
+    </p:ext>
+  </p:extLst>
 </p:presentation>
 </file>
 
@@ -197,7 +207,7 @@
           <a:p>
             <a:fld id="{38438D28-5181-4BBA-9EE9-C40E355A7B85}" type="datetimeFigureOut">
               <a:rPr lang="en-US" smtClean="0"/>
-              <a:t>1/5/2018</a:t>
+              <a:t>1/6/2018</a:t>
             </a:fld>
             <a:endParaRPr lang="en-US"/>
           </a:p>
@@ -465,6 +475,90 @@
 </p:notesMaster>
 </file>
 
+<file path=ppt/notesSlides/notesSlide1.xml><?xml version="1.0" encoding="utf-8"?>
+<p:notes xmlns:a="http://schemas.openxmlformats.org/drawingml/2006/main" xmlns:r="http://schemas.openxmlformats.org/officeDocument/2006/relationships" xmlns:p="http://schemas.openxmlformats.org/presentationml/2006/main">
+  <p:cSld>
+    <p:spTree>
+      <p:nvGrpSpPr>
+        <p:cNvPr id="1" name=""/>
+        <p:cNvGrpSpPr/>
+        <p:nvPr/>
+      </p:nvGrpSpPr>
+      <p:grpSpPr>
+        <a:xfrm>
+          <a:off x="0" y="0"/>
+          <a:ext cx="0" cy="0"/>
+          <a:chOff x="0" y="0"/>
+          <a:chExt cx="0" cy="0"/>
+        </a:xfrm>
+      </p:grpSpPr>
+      <p:sp>
+        <p:nvSpPr>
+          <p:cNvPr id="2" name="Slide Image Placeholder 1"/>
+          <p:cNvSpPr>
+            <a:spLocks noGrp="1" noRot="1" noChangeAspect="1"/>
+          </p:cNvSpPr>
+          <p:nvPr>
+            <p:ph type="sldImg"/>
+          </p:nvPr>
+        </p:nvSpPr>
+        <p:spPr/>
+      </p:sp>
+      <p:sp>
+        <p:nvSpPr>
+          <p:cNvPr id="3" name="Notes Placeholder 2"/>
+          <p:cNvSpPr>
+            <a:spLocks noGrp="1"/>
+          </p:cNvSpPr>
+          <p:nvPr>
+            <p:ph type="body" idx="1"/>
+          </p:nvPr>
+        </p:nvSpPr>
+        <p:spPr/>
+        <p:txBody>
+          <a:bodyPr/>
+          <a:lstStyle/>
+          <a:p>
+            <a:endParaRPr lang="en-US" dirty="0"/>
+          </a:p>
+        </p:txBody>
+      </p:sp>
+      <p:sp>
+        <p:nvSpPr>
+          <p:cNvPr id="4" name="Slide Number Placeholder 3"/>
+          <p:cNvSpPr>
+            <a:spLocks noGrp="1"/>
+          </p:cNvSpPr>
+          <p:nvPr>
+            <p:ph type="sldNum" sz="quarter" idx="10"/>
+          </p:nvPr>
+        </p:nvSpPr>
+        <p:spPr/>
+        <p:txBody>
+          <a:bodyPr/>
+          <a:lstStyle/>
+          <a:p>
+            <a:fld id="{39F48897-ED6E-4669-ABD2-9AF839A2FFF4}" type="slidenum">
+              <a:rPr lang="en-US" smtClean="0"/>
+              <a:t>2</a:t>
+            </a:fld>
+            <a:endParaRPr lang="en-US"/>
+          </a:p>
+        </p:txBody>
+      </p:sp>
+    </p:spTree>
+    <p:extLst>
+      <p:ext uri="{BB962C8B-B14F-4D97-AF65-F5344CB8AC3E}">
+        <p14:creationId xmlns:p14="http://schemas.microsoft.com/office/powerpoint/2010/main" val="302724299"/>
+      </p:ext>
+    </p:extLst>
+  </p:cSld>
+  <p:clrMapOvr>
+    <a:masterClrMapping/>
+  </p:clrMapOvr>
+</p:notes>
+</file>
+
 <file path=ppt/slideLayouts/slideLayout1.xml><?xml version="1.0" encoding="utf-8"?>
 <p:sldLayout xmlns:a="http://schemas.openxmlformats.org/drawingml/2006/main" xmlns:r="http://schemas.openxmlformats.org/officeDocument/2006/relationships" xmlns:p="http://schemas.openxmlformats.org/presentationml/2006/main" type="title" preserve="1">
   <p:cSld name="Title Slide">
@@ -596,7 +690,7 @@
           <a:p>
             <a:fld id="{98B3AFC5-8E30-477A-9597-5098238277F8}" type="datetime1">
               <a:rPr lang="en-US" smtClean="0"/>
-              <a:t>1/5/2018</a:t>
+              <a:t>1/6/2018</a:t>
             </a:fld>
             <a:endParaRPr lang="en-US"/>
           </a:p>
@@ -766,7 +860,7 @@
           <a:p>
             <a:fld id="{6D5D940F-2361-4F60-A299-7438A35A302C}" type="datetime1">
               <a:rPr lang="en-US" smtClean="0"/>
-              <a:t>1/5/2018</a:t>
+              <a:t>1/6/2018</a:t>
             </a:fld>
             <a:endParaRPr lang="en-US"/>
           </a:p>
@@ -946,7 +1040,7 @@
           <a:p>
             <a:fld id="{F86318A6-2BBB-4021-B620-942AF4D5851C}" type="datetime1">
               <a:rPr lang="en-US" smtClean="0"/>
-              <a:t>1/5/2018</a:t>
+              <a:t>1/6/2018</a:t>
             </a:fld>
             <a:endParaRPr lang="en-US"/>
           </a:p>
@@ -1116,7 +1210,7 @@
           <a:p>
             <a:fld id="{68366748-2FD8-42C6-A0D7-7BEA94A148D1}" type="datetime1">
               <a:rPr lang="en-US" smtClean="0"/>
-              <a:t>1/5/2018</a:t>
+              <a:t>1/6/2018</a:t>
             </a:fld>
             <a:endParaRPr lang="en-US"/>
           </a:p>
@@ -1362,7 +1456,7 @@
           <a:p>
             <a:fld id="{AFDAAA26-46EE-432A-A714-766B37C3C0E7}" type="datetime1">
               <a:rPr lang="en-US" smtClean="0"/>
-              <a:t>1/5/2018</a:t>
+              <a:t>1/6/2018</a:t>
             </a:fld>
             <a:endParaRPr lang="en-US"/>
           </a:p>
@@ -1594,7 +1688,7 @@
           <a:p>
             <a:fld id="{B936085E-97E1-4BDF-BE18-F1152311D3BF}" type="datetime1">
               <a:rPr lang="en-US" smtClean="0"/>
-              <a:t>1/5/2018</a:t>
+              <a:t>1/6/2018</a:t>
             </a:fld>
             <a:endParaRPr lang="en-US"/>
           </a:p>
@@ -1961,7 +2055,7 @@
           <a:p>
             <a:fld id="{09A70EE0-2D18-4052-B004-50D16190091B}" type="datetime1">
               <a:rPr lang="en-US" smtClean="0"/>
-              <a:t>1/5/2018</a:t>
+              <a:t>1/6/2018</a:t>
             </a:fld>
             <a:endParaRPr lang="en-US"/>
           </a:p>
@@ -2079,7 +2173,7 @@
           <a:p>
             <a:fld id="{6DF9A627-3EEC-4F12-86ED-156342F9EA06}" type="datetime1">
               <a:rPr lang="en-US" smtClean="0"/>
-              <a:t>1/5/2018</a:t>
+              <a:t>1/6/2018</a:t>
             </a:fld>
             <a:endParaRPr lang="en-US"/>
           </a:p>
@@ -2174,7 +2268,7 @@
           <a:p>
             <a:fld id="{C7EBC9A0-4A7E-41ED-963E-2E4AB7387C61}" type="datetime1">
               <a:rPr lang="en-US" smtClean="0"/>
-              <a:t>1/5/2018</a:t>
+              <a:t>1/6/2018</a:t>
             </a:fld>
             <a:endParaRPr lang="en-US"/>
           </a:p>
@@ -2451,7 +2545,7 @@
           <a:p>
             <a:fld id="{3847EB46-D459-4EE0-B4B5-4F430C90D8B8}" type="datetime1">
               <a:rPr lang="en-US" smtClean="0"/>
-              <a:t>1/5/2018</a:t>
+              <a:t>1/6/2018</a:t>
             </a:fld>
             <a:endParaRPr lang="en-US"/>
           </a:p>
@@ -2704,7 +2798,7 @@
           <a:p>
             <a:fld id="{714DE853-E43B-4309-8927-027988682784}" type="datetime1">
               <a:rPr lang="en-US" smtClean="0"/>
-              <a:t>1/5/2018</a:t>
+              <a:t>1/6/2018</a:t>
             </a:fld>
             <a:endParaRPr lang="en-US"/>
           </a:p>
@@ -2917,7 +3011,7 @@
           <a:p>
             <a:fld id="{DC241D08-CB3E-4340-9652-DD07EB073AA9}" type="datetime1">
               <a:rPr lang="en-US" smtClean="0"/>
-              <a:t>1/5/2018</a:t>
+              <a:t>1/6/2018</a:t>
             </a:fld>
             <a:endParaRPr lang="en-US"/>
           </a:p>
@@ -3333,21 +3427,33 @@
             <p:ph type="ctrTitle"/>
           </p:nvPr>
         </p:nvSpPr>
-        <p:spPr/>
-        <p:txBody>
-          <a:bodyPr/>
+        <p:spPr>
+          <a:xfrm>
+            <a:off x="1524000" y="2026022"/>
+            <a:ext cx="9144000" cy="896471"/>
+          </a:xfrm>
+        </p:spPr>
+        <p:txBody>
+          <a:bodyPr>
+            <a:normAutofit fontScale="90000"/>
+          </a:bodyPr>
           <a:lstStyle/>
           <a:p>
             <a:r>
               <a:rPr lang="en-US" dirty="0" smtClean="0"/>
-              <a:t>Skin UVB</a:t>
-            </a:r>
-            <a:br>
+              <a:t>Skin </a:t>
+            </a:r>
+            <a:r>
               <a:rPr lang="en-US" dirty="0" smtClean="0"/>
-            </a:br>
+              <a:t>UVB</a:t>
+            </a:r>
+            <a:r>
+              <a:rPr lang="en-US" dirty="0"/>
+              <a:t> </a:t>
+            </a:r>
             <a:r>
               <a:rPr lang="en-US" dirty="0" smtClean="0"/>
-              <a:t>Tumors	</a:t>
+              <a:t>Tumors</a:t>
             </a:r>
             <a:endParaRPr lang="en-US" dirty="0"/>
           </a:p>
@@ -3388,6 +3494,388 @@
     <p:extLst>
       <p:ext uri="{BB962C8B-B14F-4D97-AF65-F5344CB8AC3E}">
         <p14:creationId xmlns:p14="http://schemas.microsoft.com/office/powerpoint/2010/main" val="2466110631"/>
+      </p:ext>
+    </p:extLst>
+  </p:cSld>
+  <p:clrMapOvr>
+    <a:masterClrMapping/>
+  </p:clrMapOvr>
+</p:sld>
+</file>
+
+<file path=ppt/slides/slide10.xml><?xml version="1.0" encoding="utf-8"?>
+<p:sld xmlns:a="http://schemas.openxmlformats.org/drawingml/2006/main" xmlns:r="http://schemas.openxmlformats.org/officeDocument/2006/relationships" xmlns:p="http://schemas.openxmlformats.org/presentationml/2006/main">
+  <p:cSld>
+    <p:spTree>
+      <p:nvGrpSpPr>
+        <p:cNvPr id="1" name=""/>
+        <p:cNvGrpSpPr/>
+        <p:nvPr/>
+      </p:nvGrpSpPr>
+      <p:grpSpPr>
+        <a:xfrm>
+          <a:off x="0" y="0"/>
+          <a:ext cx="0" cy="0"/>
+          <a:chOff x="0" y="0"/>
+          <a:chExt cx="0" cy="0"/>
+        </a:xfrm>
+      </p:grpSpPr>
+      <p:sp>
+        <p:nvSpPr>
+          <p:cNvPr id="2" name="Title 1"/>
+          <p:cNvSpPr>
+            <a:spLocks noGrp="1"/>
+          </p:cNvSpPr>
+          <p:nvPr>
+            <p:ph type="title"/>
+          </p:nvPr>
+        </p:nvSpPr>
+        <p:spPr>
+          <a:xfrm>
+            <a:off x="838200" y="365126"/>
+            <a:ext cx="10515600" cy="970616"/>
+          </a:xfrm>
+        </p:spPr>
+        <p:txBody>
+          <a:bodyPr/>
+          <a:lstStyle/>
+          <a:p>
+            <a:pPr algn="ctr"/>
+            <a:r>
+              <a:rPr lang="en-US" dirty="0" smtClean="0"/>
+              <a:t>Conclusion</a:t>
+            </a:r>
+            <a:endParaRPr lang="en-US" dirty="0"/>
+          </a:p>
+        </p:txBody>
+      </p:sp>
+      <p:sp>
+        <p:nvSpPr>
+          <p:cNvPr id="3" name="Content Placeholder 2"/>
+          <p:cNvSpPr>
+            <a:spLocks noGrp="1"/>
+          </p:cNvSpPr>
+          <p:nvPr>
+            <p:ph idx="1"/>
+          </p:nvPr>
+        </p:nvSpPr>
+        <p:spPr>
+          <a:xfrm>
+            <a:off x="838200" y="1577788"/>
+            <a:ext cx="10515600" cy="4599175"/>
+          </a:xfrm>
+        </p:spPr>
+        <p:txBody>
+          <a:bodyPr>
+            <a:normAutofit/>
+          </a:bodyPr>
+          <a:lstStyle/>
+          <a:p>
+            <a:pPr>
+              <a:buFont typeface="Wingdings" panose="05000000000000000000" pitchFamily="2" charset="2"/>
+              <a:buChar char="Ø"/>
+            </a:pPr>
+            <a:r>
+              <a:rPr lang="en-US" dirty="0" smtClean="0"/>
+              <a:t>Number and size of most tumors monotonically increased over the period of 24 weeks in all 3 UVB-treated groups.</a:t>
+            </a:r>
+          </a:p>
+          <a:p>
+            <a:pPr>
+              <a:buFont typeface="Wingdings" panose="05000000000000000000" pitchFamily="2" charset="2"/>
+              <a:buChar char="Ø"/>
+            </a:pPr>
+            <a:r>
+              <a:rPr lang="en-US" dirty="0" smtClean="0"/>
+              <a:t>At the end of the study (last measurement taken at Week 24):</a:t>
+            </a:r>
+          </a:p>
+          <a:p>
+            <a:pPr lvl="1"/>
+            <a:r>
+              <a:rPr lang="en-US" dirty="0" smtClean="0"/>
+              <a:t>UVB+SFN group had </a:t>
+            </a:r>
+            <a:r>
+              <a:rPr lang="en-US" b="1" dirty="0" smtClean="0"/>
+              <a:t>significantly</a:t>
+            </a:r>
+            <a:r>
+              <a:rPr lang="en-US" dirty="0" smtClean="0"/>
+              <a:t> smaller number of tumors compared to the UA and SFN treated groups (p-value of ANOVA &lt; 0.001). UVB+UA was borderline-significant (p-value = 0.086).</a:t>
+            </a:r>
+          </a:p>
+          <a:p>
+            <a:pPr lvl="1"/>
+            <a:r>
+              <a:rPr lang="en-US" dirty="0" smtClean="0"/>
+              <a:t>If animals with no tumors are taken into account, UVB+SFN group on average had significantly smaller tumors compared to UVB-Only and UVB+SFN groups (p-value = 0.03).</a:t>
+            </a:r>
+          </a:p>
+          <a:p>
+            <a:pPr>
+              <a:buFont typeface="Wingdings" panose="05000000000000000000" pitchFamily="2" charset="2"/>
+              <a:buChar char="Ø"/>
+            </a:pPr>
+            <a:r>
+              <a:rPr lang="en-US" dirty="0" smtClean="0"/>
+              <a:t>UVB+UA also had more animals with tumors (26 out of 26) compared to UVB+SFN group (20 out of 25), same as UVB-Only (26 out of 26).</a:t>
+            </a:r>
+            <a:endParaRPr lang="en-US" dirty="0"/>
+          </a:p>
+        </p:txBody>
+      </p:sp>
+      <p:sp>
+        <p:nvSpPr>
+          <p:cNvPr id="4" name="Slide Number Placeholder 3"/>
+          <p:cNvSpPr>
+            <a:spLocks noGrp="1"/>
+          </p:cNvSpPr>
+          <p:nvPr>
+            <p:ph type="sldNum" sz="quarter" idx="12"/>
+          </p:nvPr>
+        </p:nvSpPr>
+        <p:spPr/>
+        <p:txBody>
+          <a:bodyPr/>
+          <a:lstStyle/>
+          <a:p>
+            <a:fld id="{C6028E65-7989-4318-8A09-D88C034A7CD7}" type="slidenum">
+              <a:rPr lang="en-US" smtClean="0"/>
+              <a:t>10</a:t>
+            </a:fld>
+            <a:endParaRPr lang="en-US"/>
+          </a:p>
+        </p:txBody>
+      </p:sp>
+    </p:spTree>
+    <p:extLst>
+      <p:ext uri="{BB962C8B-B14F-4D97-AF65-F5344CB8AC3E}">
+        <p14:creationId xmlns:p14="http://schemas.microsoft.com/office/powerpoint/2010/main" val="2462010119"/>
+      </p:ext>
+    </p:extLst>
+  </p:cSld>
+  <p:clrMapOvr>
+    <a:masterClrMapping/>
+  </p:clrMapOvr>
+</p:sld>
+</file>
+
+<file path=ppt/slides/slide11.xml><?xml version="1.0" encoding="utf-8"?>
+<p:sld xmlns:a="http://schemas.openxmlformats.org/drawingml/2006/main" xmlns:r="http://schemas.openxmlformats.org/officeDocument/2006/relationships" xmlns:p="http://schemas.openxmlformats.org/presentationml/2006/main">
+  <p:cSld>
+    <p:spTree>
+      <p:nvGrpSpPr>
+        <p:cNvPr id="1" name=""/>
+        <p:cNvGrpSpPr/>
+        <p:nvPr/>
+      </p:nvGrpSpPr>
+      <p:grpSpPr>
+        <a:xfrm>
+          <a:off x="0" y="0"/>
+          <a:ext cx="0" cy="0"/>
+          <a:chOff x="0" y="0"/>
+          <a:chExt cx="0" cy="0"/>
+        </a:xfrm>
+      </p:grpSpPr>
+      <p:sp>
+        <p:nvSpPr>
+          <p:cNvPr id="2" name="Title 1"/>
+          <p:cNvSpPr>
+            <a:spLocks noGrp="1"/>
+          </p:cNvSpPr>
+          <p:nvPr>
+            <p:ph type="title"/>
+          </p:nvPr>
+        </p:nvSpPr>
+        <p:spPr>
+          <a:xfrm>
+            <a:off x="838200" y="365125"/>
+            <a:ext cx="10515600" cy="782357"/>
+          </a:xfrm>
+        </p:spPr>
+        <p:txBody>
+          <a:bodyPr/>
+          <a:lstStyle/>
+          <a:p>
+            <a:pPr algn="ctr"/>
+            <a:r>
+              <a:rPr lang="en-US" dirty="0" smtClean="0"/>
+              <a:t>Additional Q&amp;A (Anne, 01/06/2018)</a:t>
+            </a:r>
+            <a:endParaRPr lang="en-US" dirty="0"/>
+          </a:p>
+        </p:txBody>
+      </p:sp>
+      <p:sp>
+        <p:nvSpPr>
+          <p:cNvPr id="3" name="Content Placeholder 2"/>
+          <p:cNvSpPr>
+            <a:spLocks noGrp="1"/>
+          </p:cNvSpPr>
+          <p:nvPr>
+            <p:ph idx="1"/>
+          </p:nvPr>
+        </p:nvSpPr>
+        <p:spPr>
+          <a:xfrm>
+            <a:off x="838200" y="1341531"/>
+            <a:ext cx="10515600" cy="4521388"/>
+          </a:xfrm>
+        </p:spPr>
+        <p:txBody>
+          <a:bodyPr>
+            <a:normAutofit fontScale="92500" lnSpcReduction="20000"/>
+          </a:bodyPr>
+          <a:lstStyle/>
+          <a:p>
+            <a:pPr marL="0" indent="0">
+              <a:buNone/>
+            </a:pPr>
+            <a:r>
+              <a:rPr lang="en-US" dirty="0" smtClean="0"/>
+              <a:t>Q1: Is there a difference in average tumor volume at 24 weeks?</a:t>
+            </a:r>
+          </a:p>
+          <a:p>
+            <a:pPr marL="0" indent="0">
+              <a:buNone/>
+            </a:pPr>
+            <a:r>
+              <a:rPr lang="en-US" dirty="0" smtClean="0"/>
+              <a:t>A1: No, there is no difference in the average tumor volumes between the 3 groups (Slide 7 right panel).</a:t>
+            </a:r>
+          </a:p>
+          <a:p>
+            <a:pPr marL="0" indent="0">
+              <a:buNone/>
+            </a:pPr>
+            <a:endParaRPr lang="en-US" dirty="0"/>
+          </a:p>
+          <a:p>
+            <a:pPr marL="0" indent="0">
+              <a:buNone/>
+            </a:pPr>
+            <a:r>
+              <a:rPr lang="en-US" dirty="0" smtClean="0"/>
+              <a:t>Q2: Are there significant differences at weeks 20 &amp; 22?</a:t>
+            </a:r>
+          </a:p>
+          <a:p>
+            <a:pPr marL="0" indent="0">
+              <a:buNone/>
+            </a:pPr>
+            <a:r>
+              <a:rPr lang="en-US" dirty="0" smtClean="0"/>
+              <a:t>A2a: At Week 22, SFN had significantly less tumors by total volume (p-value = 0.032); both, UA and SFN had smaller number of tumors compared to UVB-Only (p-values = 0.006 and 0.013 respectively).</a:t>
+            </a:r>
+          </a:p>
+          <a:p>
+            <a:pPr marL="0" indent="0">
+              <a:buNone/>
+            </a:pPr>
+            <a:r>
+              <a:rPr lang="en-US" dirty="0" smtClean="0"/>
+              <a:t>A2b: At week 20, </a:t>
+            </a:r>
+            <a:r>
+              <a:rPr lang="en-US" dirty="0"/>
+              <a:t>SFN had significantly less tumors by total volume </a:t>
+            </a:r>
+            <a:r>
+              <a:rPr lang="en-US" dirty="0" smtClean="0"/>
+              <a:t>and number of tumors(p-values </a:t>
+            </a:r>
+            <a:r>
+              <a:rPr lang="en-US" dirty="0"/>
+              <a:t>= </a:t>
+            </a:r>
+            <a:r>
+              <a:rPr lang="en-US" dirty="0" smtClean="0"/>
+              <a:t>0.001 and 0.003 respectively); </a:t>
+            </a:r>
+            <a:r>
+              <a:rPr lang="en-US" dirty="0"/>
+              <a:t>both, UA and SFN had smaller </a:t>
+            </a:r>
+            <a:r>
+              <a:rPr lang="en-US" dirty="0" smtClean="0"/>
+              <a:t>tumors (average tumor size) </a:t>
+            </a:r>
+            <a:r>
+              <a:rPr lang="en-US" dirty="0"/>
+              <a:t>compared to UVB-Only (p-values = </a:t>
+            </a:r>
+            <a:r>
+              <a:rPr lang="en-US" dirty="0" smtClean="0"/>
+              <a:t>0.021 </a:t>
+            </a:r>
+            <a:r>
+              <a:rPr lang="en-US" dirty="0"/>
+              <a:t>and </a:t>
+            </a:r>
+            <a:r>
+              <a:rPr lang="en-US" dirty="0" smtClean="0"/>
+              <a:t>&lt;0.001 </a:t>
+            </a:r>
+            <a:r>
+              <a:rPr lang="en-US" dirty="0"/>
+              <a:t>respectively).</a:t>
+            </a:r>
+          </a:p>
+          <a:p>
+            <a:pPr marL="0" indent="0">
+              <a:buNone/>
+            </a:pPr>
+            <a:endParaRPr lang="en-US" dirty="0" smtClean="0"/>
+          </a:p>
+          <a:p>
+            <a:pPr marL="0" indent="0">
+              <a:buNone/>
+            </a:pPr>
+            <a:endParaRPr lang="en-US" dirty="0" smtClean="0"/>
+          </a:p>
+          <a:p>
+            <a:pPr marL="0" indent="0">
+              <a:buNone/>
+            </a:pPr>
+            <a:endParaRPr lang="en-US" dirty="0"/>
+          </a:p>
+          <a:p>
+            <a:pPr marL="0" indent="0">
+              <a:buNone/>
+            </a:pPr>
+            <a:endParaRPr lang="en-US" dirty="0"/>
+          </a:p>
+        </p:txBody>
+      </p:sp>
+      <p:sp>
+        <p:nvSpPr>
+          <p:cNvPr id="4" name="Slide Number Placeholder 3"/>
+          <p:cNvSpPr>
+            <a:spLocks noGrp="1"/>
+          </p:cNvSpPr>
+          <p:nvPr>
+            <p:ph type="sldNum" sz="quarter" idx="12"/>
+          </p:nvPr>
+        </p:nvSpPr>
+        <p:spPr/>
+        <p:txBody>
+          <a:bodyPr/>
+          <a:lstStyle/>
+          <a:p>
+            <a:fld id="{C6028E65-7989-4318-8A09-D88C034A7CD7}" type="slidenum">
+              <a:rPr lang="en-US" smtClean="0"/>
+              <a:t>11</a:t>
+            </a:fld>
+            <a:endParaRPr lang="en-US"/>
+          </a:p>
+        </p:txBody>
+      </p:sp>
+    </p:spTree>
+    <p:extLst>
+      <p:ext uri="{BB962C8B-B14F-4D97-AF65-F5344CB8AC3E}">
+        <p14:creationId xmlns:p14="http://schemas.microsoft.com/office/powerpoint/2010/main" val="2068141531"/>
       </p:ext>
     </p:extLst>
   </p:cSld>
@@ -3424,7 +3912,12 @@
             <p:ph type="title"/>
           </p:nvPr>
         </p:nvSpPr>
-        <p:spPr/>
+        <p:spPr>
+          <a:xfrm>
+            <a:off x="838200" y="365126"/>
+            <a:ext cx="10515600" cy="709789"/>
+          </a:xfrm>
+        </p:spPr>
         <p:txBody>
           <a:bodyPr/>
           <a:lstStyle/>
@@ -3449,7 +3942,7 @@
           </p:nvPr>
         </p:nvPicPr>
         <p:blipFill>
-          <a:blip r:embed="rId2" cstate="print">
+          <a:blip r:embed="rId3" cstate="print">
             <a:extLst>
               <a:ext uri="{28A0092B-C50C-407E-A947-70E740481C1C}">
                 <a14:useLocalDpi xmlns:a14="http://schemas.microsoft.com/office/drawing/2010/main" val="0"/>
@@ -3462,8 +3955,8 @@
         </p:blipFill>
         <p:spPr>
           <a:xfrm>
-            <a:off x="210150" y="1801809"/>
-            <a:ext cx="6091873" cy="4351337"/>
+            <a:off x="190863" y="1303509"/>
+            <a:ext cx="6008142" cy="4291529"/>
           </a:xfrm>
         </p:spPr>
       </p:pic>
@@ -3476,13 +3969,13 @@
           <p:nvPr>
             <p:extLst>
               <p:ext uri="{D42A27DB-BD31-4B8C-83A1-F6EECF244321}">
-                <p14:modId xmlns:p14="http://schemas.microsoft.com/office/powerpoint/2010/main" val="1000111232"/>
+                <p14:modId xmlns:p14="http://schemas.microsoft.com/office/powerpoint/2010/main" val="2827215162"/>
               </p:ext>
             </p:extLst>
           </p:nvPr>
         </p:nvGraphicFramePr>
         <p:xfrm>
-          <a:off x="6302022" y="2559261"/>
+          <a:off x="6250518" y="1897065"/>
           <a:ext cx="5565289" cy="925830"/>
         </p:xfrm>
         <a:graphic>
@@ -3692,11 +4185,14 @@
                     <a:p>
                       <a:pPr algn="r" fontAlgn="t"/>
                       <a:r>
-                        <a:rPr lang="en-US" sz="1400">
+                        <a:rPr lang="en-US" sz="1400" dirty="0" smtClean="0">
                           <a:effectLst/>
                         </a:rPr>
-                        <a:t>6</a:t>
-                      </a:r>
+                        <a:t>10</a:t>
+                      </a:r>
+                      <a:endParaRPr lang="en-US" sz="1400" dirty="0">
+                        <a:effectLst/>
+                      </a:endParaRPr>
                     </a:p>
                   </a:txBody>
                   <a:tcPr marL="47625" marR="47625" marT="47625" marB="47625"/>
@@ -3708,11 +4204,14 @@
                     <a:p>
                       <a:pPr algn="r" fontAlgn="t"/>
                       <a:r>
-                        <a:rPr lang="en-US" sz="1400">
+                        <a:rPr lang="en-US" sz="1400" dirty="0" smtClean="0">
                           <a:effectLst/>
                         </a:rPr>
-                        <a:t>6</a:t>
-                      </a:r>
+                        <a:t>10</a:t>
+                      </a:r>
+                      <a:endParaRPr lang="en-US" sz="1400" dirty="0">
+                        <a:effectLst/>
+                      </a:endParaRPr>
                     </a:p>
                   </a:txBody>
                   <a:tcPr marL="47625" marR="47625" marT="47625" marB="47625"/>
@@ -3724,11 +4223,14 @@
                     <a:p>
                       <a:pPr algn="r" fontAlgn="t"/>
                       <a:r>
-                        <a:rPr lang="en-US" sz="1400">
+                        <a:rPr lang="en-US" sz="1400" dirty="0" smtClean="0">
                           <a:effectLst/>
                         </a:rPr>
-                        <a:t>6</a:t>
-                      </a:r>
+                        <a:t>10</a:t>
+                      </a:r>
+                      <a:endParaRPr lang="en-US" sz="1400" dirty="0">
+                        <a:effectLst/>
+                      </a:endParaRPr>
                     </a:p>
                   </a:txBody>
                   <a:tcPr marL="47625" marR="47625" marT="47625" marB="47625"/>
@@ -3740,11 +4242,14 @@
                     <a:p>
                       <a:pPr algn="r" fontAlgn="t"/>
                       <a:r>
-                        <a:rPr lang="en-US" sz="1400">
+                        <a:rPr lang="en-US" sz="1400" dirty="0" smtClean="0">
                           <a:effectLst/>
                         </a:rPr>
-                        <a:t>0</a:t>
-                      </a:r>
+                        <a:t>13</a:t>
+                      </a:r>
+                      <a:endParaRPr lang="en-US" sz="1400" dirty="0">
+                        <a:effectLst/>
+                      </a:endParaRPr>
                     </a:p>
                   </a:txBody>
                   <a:tcPr marL="47625" marR="47625" marT="47625" marB="47625"/>
@@ -3756,11 +4261,14 @@
                     <a:p>
                       <a:pPr algn="r" fontAlgn="t"/>
                       <a:r>
-                        <a:rPr lang="en-US" sz="1400">
+                        <a:rPr lang="en-US" sz="1400" dirty="0" smtClean="0">
                           <a:effectLst/>
                         </a:rPr>
-                        <a:t>0</a:t>
-                      </a:r>
+                        <a:t>15</a:t>
+                      </a:r>
+                      <a:endParaRPr lang="en-US" sz="1400" dirty="0">
+                        <a:effectLst/>
+                      </a:endParaRPr>
                     </a:p>
                   </a:txBody>
                   <a:tcPr marL="47625" marR="47625" marT="47625" marB="47625"/>
@@ -3772,11 +4280,14 @@
                     <a:p>
                       <a:pPr algn="r" fontAlgn="t"/>
                       <a:r>
-                        <a:rPr lang="en-US" sz="1400">
+                        <a:rPr lang="en-US" sz="1400" dirty="0" smtClean="0">
                           <a:effectLst/>
                         </a:rPr>
-                        <a:t>5</a:t>
-                      </a:r>
+                        <a:t>24</a:t>
+                      </a:r>
+                      <a:endParaRPr lang="en-US" sz="1400" dirty="0">
+                        <a:effectLst/>
+                      </a:endParaRPr>
                     </a:p>
                   </a:txBody>
                   <a:tcPr marL="47625" marR="47625" marT="47625" marB="47625"/>
@@ -3814,38 +4325,6 @@
                     <a:p>
                       <a:pPr algn="r" fontAlgn="t"/>
                       <a:r>
-                        <a:rPr lang="en-US" sz="1400">
-                          <a:effectLst/>
-                        </a:rPr>
-                        <a:t>0</a:t>
-                      </a:r>
-                    </a:p>
-                  </a:txBody>
-                  <a:tcPr marL="47625" marR="47625" marT="47625" marB="47625"/>
-                </a:tc>
-                <a:tc>
-                  <a:txBody>
-                    <a:bodyPr/>
-                    <a:lstStyle/>
-                    <a:p>
-                      <a:pPr algn="r" fontAlgn="t"/>
-                      <a:r>
-                        <a:rPr lang="en-US" sz="1400">
-                          <a:effectLst/>
-                        </a:rPr>
-                        <a:t>0</a:t>
-                      </a:r>
-                    </a:p>
-                  </a:txBody>
-                  <a:tcPr marL="47625" marR="47625" marT="47625" marB="47625"/>
-                </a:tc>
-                <a:tc>
-                  <a:txBody>
-                    <a:bodyPr/>
-                    <a:lstStyle/>
-                    <a:p>
-                      <a:pPr algn="r" fontAlgn="t"/>
-                      <a:r>
                         <a:rPr lang="en-US" sz="1400" dirty="0">
                           <a:effectLst/>
                         </a:rPr>
@@ -3862,26 +4341,10 @@
                     <a:p>
                       <a:pPr algn="r" fontAlgn="t"/>
                       <a:r>
-                        <a:rPr lang="en-US" sz="1400">
-                          <a:effectLst/>
-                        </a:rPr>
-                        <a:t>26</a:t>
-                      </a:r>
-                    </a:p>
-                  </a:txBody>
-                  <a:tcPr marL="47625" marR="47625" marT="47625" marB="47625"/>
-                </a:tc>
-                <a:tc>
-                  <a:txBody>
-                    <a:bodyPr/>
-                    <a:lstStyle/>
-                    <a:p>
-                      <a:pPr algn="r" fontAlgn="t"/>
-                      <a:r>
                         <a:rPr lang="en-US" sz="1400" dirty="0">
                           <a:effectLst/>
                         </a:rPr>
-                        <a:t>26</a:t>
+                        <a:t>0</a:t>
                       </a:r>
                     </a:p>
                   </a:txBody>
@@ -3897,8 +4360,65 @@
                         <a:rPr lang="en-US" sz="1400" dirty="0">
                           <a:effectLst/>
                         </a:rPr>
-                        <a:t>20</a:t>
-                      </a:r>
+                        <a:t>0</a:t>
+                      </a:r>
+                    </a:p>
+                  </a:txBody>
+                  <a:tcPr marL="47625" marR="47625" marT="47625" marB="47625"/>
+                </a:tc>
+                <a:tc>
+                  <a:txBody>
+                    <a:bodyPr/>
+                    <a:lstStyle/>
+                    <a:p>
+                      <a:pPr algn="r" fontAlgn="t"/>
+                      <a:r>
+                        <a:rPr lang="en-US" sz="1400" dirty="0" smtClean="0">
+                          <a:effectLst/>
+                        </a:rPr>
+                        <a:t>19</a:t>
+                      </a:r>
+                      <a:endParaRPr lang="en-US" sz="1400" dirty="0">
+                        <a:effectLst/>
+                      </a:endParaRPr>
+                    </a:p>
+                  </a:txBody>
+                  <a:tcPr marL="47625" marR="47625" marT="47625" marB="47625"/>
+                </a:tc>
+                <a:tc>
+                  <a:txBody>
+                    <a:bodyPr/>
+                    <a:lstStyle/>
+                    <a:p>
+                      <a:pPr algn="r" fontAlgn="t"/>
+                      <a:r>
+                        <a:rPr lang="en-US" sz="1400" dirty="0" smtClean="0">
+                          <a:effectLst/>
+                        </a:rPr>
+                        <a:t>17</a:t>
+                      </a:r>
+                      <a:endParaRPr lang="en-US" sz="1400" dirty="0">
+                        <a:effectLst/>
+                      </a:endParaRPr>
+                    </a:p>
+                  </a:txBody>
+                  <a:tcPr marL="47625" marR="47625" marT="47625" marB="47625"/>
+                </a:tc>
+                <a:tc>
+                  <a:txBody>
+                    <a:bodyPr/>
+                    <a:lstStyle/>
+                    <a:p>
+                      <a:pPr algn="r" fontAlgn="t"/>
+                      <a:r>
+                        <a:rPr lang="en-US" sz="1400" dirty="0" smtClean="0">
+                          <a:effectLst/>
+                        </a:rPr>
+                        <a:t>7</a:t>
+                      </a:r>
+                      <a:endParaRPr lang="en-US" sz="1400" dirty="0">
+                        <a:effectLst/>
+                      </a:endParaRPr>
                     </a:p>
                   </a:txBody>
                   <a:tcPr marL="47625" marR="47625" marT="47625" marB="47625"/>
@@ -3921,7 +4441,7 @@
         </p:nvSpPr>
         <p:spPr>
           <a:xfrm>
-            <a:off x="6302023" y="1801809"/>
+            <a:off x="6250515" y="1275459"/>
             <a:ext cx="5565289" cy="646331"/>
           </a:xfrm>
           <a:prstGeom prst="rect">
@@ -3942,7 +4462,17 @@
                 <a:effectLst/>
                 <a:latin typeface="Helvetica Neue"/>
               </a:rPr>
-              <a:t>Table 1: Number of animals with and without tumors in each treatment group at Week 24</a:t>
+              <a:t>Table 1: Number of animals with and without tumors in each treatment group at Week </a:t>
+            </a:r>
+            <a:r>
+              <a:rPr lang="en-US" b="0" i="0" dirty="0" smtClean="0">
+                <a:solidFill>
+                  <a:srgbClr val="333333"/>
+                </a:solidFill>
+                <a:effectLst/>
+                <a:latin typeface="Helvetica Neue"/>
+              </a:rPr>
+              <a:t>20</a:t>
             </a:r>
             <a:endParaRPr lang="en-US" b="0" i="0" dirty="0">
               <a:solidFill>
@@ -3977,6 +4507,1048 @@
           </a:p>
         </p:txBody>
       </p:sp>
+      <p:sp>
+        <p:nvSpPr>
+          <p:cNvPr id="8" name="Rectangle 7"/>
+          <p:cNvSpPr/>
+          <p:nvPr/>
+        </p:nvSpPr>
+        <p:spPr>
+          <a:xfrm>
+            <a:off x="6276271" y="3121335"/>
+            <a:ext cx="5565289" cy="646331"/>
+          </a:xfrm>
+          <a:prstGeom prst="rect">
+            <a:avLst/>
+          </a:prstGeom>
+        </p:spPr>
+        <p:txBody>
+          <a:bodyPr wrap="square">
+            <a:spAutoFit/>
+          </a:bodyPr>
+          <a:lstStyle/>
+          <a:p>
+            <a:r>
+              <a:rPr lang="en-US" b="0" i="0" dirty="0" smtClean="0">
+                <a:solidFill>
+                  <a:srgbClr val="333333"/>
+                </a:solidFill>
+                <a:effectLst/>
+                <a:latin typeface="Helvetica Neue"/>
+              </a:rPr>
+              <a:t>Table </a:t>
+            </a:r>
+            <a:r>
+              <a:rPr lang="en-US" b="0" i="0" dirty="0" smtClean="0">
+                <a:solidFill>
+                  <a:srgbClr val="333333"/>
+                </a:solidFill>
+                <a:effectLst/>
+                <a:latin typeface="Helvetica Neue"/>
+              </a:rPr>
+              <a:t>2: </a:t>
+            </a:r>
+            <a:r>
+              <a:rPr lang="en-US" b="0" i="0" dirty="0" smtClean="0">
+                <a:solidFill>
+                  <a:srgbClr val="333333"/>
+                </a:solidFill>
+                <a:effectLst/>
+                <a:latin typeface="Helvetica Neue"/>
+              </a:rPr>
+              <a:t>Number of animals with and without tumors in each treatment group at Week </a:t>
+            </a:r>
+            <a:r>
+              <a:rPr lang="en-US" b="0" i="0" dirty="0" smtClean="0">
+                <a:solidFill>
+                  <a:srgbClr val="333333"/>
+                </a:solidFill>
+                <a:effectLst/>
+                <a:latin typeface="Helvetica Neue"/>
+              </a:rPr>
+              <a:t>22</a:t>
+            </a:r>
+            <a:endParaRPr lang="en-US" b="0" i="0" dirty="0">
+              <a:solidFill>
+                <a:srgbClr val="333333"/>
+              </a:solidFill>
+              <a:effectLst/>
+              <a:latin typeface="Helvetica Neue"/>
+            </a:endParaRPr>
+          </a:p>
+        </p:txBody>
+      </p:sp>
+      <p:sp>
+        <p:nvSpPr>
+          <p:cNvPr id="9" name="Rectangle 8"/>
+          <p:cNvSpPr/>
+          <p:nvPr/>
+        </p:nvSpPr>
+        <p:spPr>
+          <a:xfrm>
+            <a:off x="6250514" y="4875933"/>
+            <a:ext cx="5565289" cy="646331"/>
+          </a:xfrm>
+          <a:prstGeom prst="rect">
+            <a:avLst/>
+          </a:prstGeom>
+        </p:spPr>
+        <p:txBody>
+          <a:bodyPr wrap="square">
+            <a:spAutoFit/>
+          </a:bodyPr>
+          <a:lstStyle/>
+          <a:p>
+            <a:r>
+              <a:rPr lang="en-US" b="0" i="0" dirty="0" smtClean="0">
+                <a:solidFill>
+                  <a:srgbClr val="333333"/>
+                </a:solidFill>
+                <a:effectLst/>
+                <a:latin typeface="Helvetica Neue"/>
+              </a:rPr>
+              <a:t>Table </a:t>
+            </a:r>
+            <a:r>
+              <a:rPr lang="en-US" b="0" i="0" dirty="0" smtClean="0">
+                <a:solidFill>
+                  <a:srgbClr val="333333"/>
+                </a:solidFill>
+                <a:effectLst/>
+                <a:latin typeface="Helvetica Neue"/>
+              </a:rPr>
+              <a:t>3: </a:t>
+            </a:r>
+            <a:r>
+              <a:rPr lang="en-US" b="0" i="0" dirty="0" smtClean="0">
+                <a:solidFill>
+                  <a:srgbClr val="333333"/>
+                </a:solidFill>
+                <a:effectLst/>
+                <a:latin typeface="Helvetica Neue"/>
+              </a:rPr>
+              <a:t>Number of animals with and without tumors in each treatment group at Week 24</a:t>
+            </a:r>
+            <a:endParaRPr lang="en-US" b="0" i="0" dirty="0">
+              <a:solidFill>
+                <a:srgbClr val="333333"/>
+              </a:solidFill>
+              <a:effectLst/>
+              <a:latin typeface="Helvetica Neue"/>
+            </a:endParaRPr>
+          </a:p>
+        </p:txBody>
+      </p:sp>
+      <p:graphicFrame>
+        <p:nvGraphicFramePr>
+          <p:cNvPr id="10" name="Table 9"/>
+          <p:cNvGraphicFramePr>
+            <a:graphicFrameLocks noGrp="1"/>
+          </p:cNvGraphicFramePr>
+          <p:nvPr>
+            <p:extLst>
+              <p:ext uri="{D42A27DB-BD31-4B8C-83A1-F6EECF244321}">
+                <p14:modId xmlns:p14="http://schemas.microsoft.com/office/powerpoint/2010/main" val="4159022959"/>
+              </p:ext>
+            </p:extLst>
+          </p:nvPr>
+        </p:nvGraphicFramePr>
+        <p:xfrm>
+          <a:off x="6276271" y="3721509"/>
+          <a:ext cx="5565289" cy="925830"/>
+        </p:xfrm>
+        <a:graphic>
+          <a:graphicData uri="http://schemas.openxmlformats.org/drawingml/2006/table">
+            <a:tbl>
+              <a:tblPr>
+                <a:tableStyleId>{5940675A-B579-460E-94D1-54222C63F5DA}</a:tableStyleId>
+              </a:tblPr>
+              <a:tblGrid>
+                <a:gridCol w="1280160">
+                  <a:extLst>
+                    <a:ext uri="{9D8B030D-6E8A-4147-A177-3AD203B41FA5}">
+                      <a16:colId xmlns:a16="http://schemas.microsoft.com/office/drawing/2014/main" val="1840728317"/>
+                    </a:ext>
+                  </a:extLst>
+                </a:gridCol>
+                <a:gridCol w="717176">
+                  <a:extLst>
+                    <a:ext uri="{9D8B030D-6E8A-4147-A177-3AD203B41FA5}">
+                      <a16:colId xmlns:a16="http://schemas.microsoft.com/office/drawing/2014/main" val="1320640928"/>
+                    </a:ext>
+                  </a:extLst>
+                </a:gridCol>
+                <a:gridCol w="681318">
+                  <a:extLst>
+                    <a:ext uri="{9D8B030D-6E8A-4147-A177-3AD203B41FA5}">
+                      <a16:colId xmlns:a16="http://schemas.microsoft.com/office/drawing/2014/main" val="2173811653"/>
+                    </a:ext>
+                  </a:extLst>
+                </a:gridCol>
+                <a:gridCol w="753035">
+                  <a:extLst>
+                    <a:ext uri="{9D8B030D-6E8A-4147-A177-3AD203B41FA5}">
+                      <a16:colId xmlns:a16="http://schemas.microsoft.com/office/drawing/2014/main" val="3796036014"/>
+                    </a:ext>
+                  </a:extLst>
+                </a:gridCol>
+                <a:gridCol w="528918">
+                  <a:extLst>
+                    <a:ext uri="{9D8B030D-6E8A-4147-A177-3AD203B41FA5}">
+                      <a16:colId xmlns:a16="http://schemas.microsoft.com/office/drawing/2014/main" val="1002921286"/>
+                    </a:ext>
+                  </a:extLst>
+                </a:gridCol>
+                <a:gridCol w="726141">
+                  <a:extLst>
+                    <a:ext uri="{9D8B030D-6E8A-4147-A177-3AD203B41FA5}">
+                      <a16:colId xmlns:a16="http://schemas.microsoft.com/office/drawing/2014/main" val="4269128020"/>
+                    </a:ext>
+                  </a:extLst>
+                </a:gridCol>
+                <a:gridCol w="878541">
+                  <a:extLst>
+                    <a:ext uri="{9D8B030D-6E8A-4147-A177-3AD203B41FA5}">
+                      <a16:colId xmlns:a16="http://schemas.microsoft.com/office/drawing/2014/main" val="787463210"/>
+                    </a:ext>
+                  </a:extLst>
+                </a:gridCol>
+              </a:tblGrid>
+              <a:tr h="299011">
+                <a:tc>
+                  <a:txBody>
+                    <a:bodyPr/>
+                    <a:lstStyle/>
+                    <a:p>
+                      <a:r>
+                        <a:rPr lang="en-US" sz="1400" dirty="0" smtClean="0"/>
+                        <a:t>Tumors Present</a:t>
+                      </a:r>
+                      <a:endParaRPr lang="en-US" sz="1400" dirty="0"/>
+                    </a:p>
+                  </a:txBody>
+                  <a:tcPr marL="47625" marR="47625" marT="47625" marB="47625" anchor="b"/>
+                </a:tc>
+                <a:tc>
+                  <a:txBody>
+                    <a:bodyPr/>
+                    <a:lstStyle/>
+                    <a:p>
+                      <a:pPr algn="r" fontAlgn="b"/>
+                      <a:r>
+                        <a:rPr lang="en-US" sz="1400" dirty="0" smtClean="0">
+                          <a:effectLst/>
+                        </a:rPr>
+                        <a:t>No </a:t>
+                      </a:r>
+                      <a:r>
+                        <a:rPr lang="en-US" sz="1400" dirty="0">
+                          <a:effectLst/>
+                        </a:rPr>
+                        <a:t>UVB</a:t>
+                      </a:r>
+                    </a:p>
+                  </a:txBody>
+                  <a:tcPr marL="47625" marR="47625" marT="47625" marB="47625" anchor="b"/>
+                </a:tc>
+                <a:tc>
+                  <a:txBody>
+                    <a:bodyPr/>
+                    <a:lstStyle/>
+                    <a:p>
+                      <a:pPr algn="r" fontAlgn="b"/>
+                      <a:r>
+                        <a:rPr lang="en-US" sz="1400" dirty="0">
+                          <a:effectLst/>
+                        </a:rPr>
+                        <a:t>UA only</a:t>
+                      </a:r>
+                    </a:p>
+                  </a:txBody>
+                  <a:tcPr marL="47625" marR="47625" marT="47625" marB="47625" anchor="b"/>
+                </a:tc>
+                <a:tc>
+                  <a:txBody>
+                    <a:bodyPr/>
+                    <a:lstStyle/>
+                    <a:p>
+                      <a:pPr algn="r" fontAlgn="b"/>
+                      <a:r>
+                        <a:rPr lang="en-US" sz="1400" dirty="0">
+                          <a:effectLst/>
+                        </a:rPr>
+                        <a:t>SFN only</a:t>
+                      </a:r>
+                    </a:p>
+                  </a:txBody>
+                  <a:tcPr marL="47625" marR="47625" marT="47625" marB="47625" anchor="b"/>
+                </a:tc>
+                <a:tc>
+                  <a:txBody>
+                    <a:bodyPr/>
+                    <a:lstStyle/>
+                    <a:p>
+                      <a:pPr algn="r" fontAlgn="b"/>
+                      <a:r>
+                        <a:rPr lang="en-US" sz="1400">
+                          <a:effectLst/>
+                        </a:rPr>
+                        <a:t>UVB</a:t>
+                      </a:r>
+                    </a:p>
+                  </a:txBody>
+                  <a:tcPr marL="47625" marR="47625" marT="47625" marB="47625" anchor="b"/>
+                </a:tc>
+                <a:tc>
+                  <a:txBody>
+                    <a:bodyPr/>
+                    <a:lstStyle/>
+                    <a:p>
+                      <a:pPr algn="r" fontAlgn="b"/>
+                      <a:r>
+                        <a:rPr lang="en-US" sz="1400">
+                          <a:effectLst/>
+                        </a:rPr>
+                        <a:t>UVB+UA</a:t>
+                      </a:r>
+                    </a:p>
+                  </a:txBody>
+                  <a:tcPr marL="47625" marR="47625" marT="47625" marB="47625" anchor="b"/>
+                </a:tc>
+                <a:tc>
+                  <a:txBody>
+                    <a:bodyPr/>
+                    <a:lstStyle/>
+                    <a:p>
+                      <a:pPr algn="r" fontAlgn="b"/>
+                      <a:r>
+                        <a:rPr lang="en-US" sz="1400" dirty="0">
+                          <a:effectLst/>
+                        </a:rPr>
+                        <a:t>UVB+SFN</a:t>
+                      </a:r>
+                    </a:p>
+                  </a:txBody>
+                  <a:tcPr marL="47625" marR="47625" marT="47625" marB="47625" anchor="b"/>
+                </a:tc>
+                <a:extLst>
+                  <a:ext uri="{0D108BD9-81ED-4DB2-BD59-A6C34878D82A}">
+                    <a16:rowId xmlns:a16="http://schemas.microsoft.com/office/drawing/2014/main" val="2930497339"/>
+                  </a:ext>
+                </a:extLst>
+              </a:tr>
+              <a:tr h="141717">
+                <a:tc>
+                  <a:txBody>
+                    <a:bodyPr/>
+                    <a:lstStyle/>
+                    <a:p>
+                      <a:pPr algn="l" fontAlgn="t"/>
+                      <a:r>
+                        <a:rPr lang="en-US" sz="1400" dirty="0" smtClean="0">
+                          <a:effectLst/>
+                        </a:rPr>
+                        <a:t>No</a:t>
+                      </a:r>
+                      <a:endParaRPr lang="en-US" sz="1400" dirty="0">
+                        <a:effectLst/>
+                      </a:endParaRPr>
+                    </a:p>
+                  </a:txBody>
+                  <a:tcPr marL="47625" marR="47625" marT="47625" marB="47625"/>
+                </a:tc>
+                <a:tc>
+                  <a:txBody>
+                    <a:bodyPr/>
+                    <a:lstStyle/>
+                    <a:p>
+                      <a:pPr algn="r" fontAlgn="t"/>
+                      <a:r>
+                        <a:rPr lang="en-US" sz="1400" dirty="0">
+                          <a:effectLst/>
+                        </a:rPr>
+                        <a:t>6</a:t>
+                      </a:r>
+                    </a:p>
+                  </a:txBody>
+                  <a:tcPr marL="47625" marR="47625" marT="47625" marB="47625"/>
+                </a:tc>
+                <a:tc>
+                  <a:txBody>
+                    <a:bodyPr/>
+                    <a:lstStyle/>
+                    <a:p>
+                      <a:pPr algn="r" fontAlgn="t"/>
+                      <a:r>
+                        <a:rPr lang="en-US" sz="1400">
+                          <a:effectLst/>
+                        </a:rPr>
+                        <a:t>6</a:t>
+                      </a:r>
+                    </a:p>
+                  </a:txBody>
+                  <a:tcPr marL="47625" marR="47625" marT="47625" marB="47625"/>
+                </a:tc>
+                <a:tc>
+                  <a:txBody>
+                    <a:bodyPr/>
+                    <a:lstStyle/>
+                    <a:p>
+                      <a:pPr algn="r" fontAlgn="t"/>
+                      <a:r>
+                        <a:rPr lang="en-US" sz="1400" dirty="0">
+                          <a:effectLst/>
+                        </a:rPr>
+                        <a:t>6</a:t>
+                      </a:r>
+                    </a:p>
+                  </a:txBody>
+                  <a:tcPr marL="47625" marR="47625" marT="47625" marB="47625"/>
+                </a:tc>
+                <a:tc>
+                  <a:txBody>
+                    <a:bodyPr/>
+                    <a:lstStyle/>
+                    <a:p>
+                      <a:pPr algn="r" fontAlgn="t"/>
+                      <a:r>
+                        <a:rPr lang="en-US" sz="1400" dirty="0" smtClean="0">
+                          <a:effectLst/>
+                        </a:rPr>
+                        <a:t>1</a:t>
+                      </a:r>
+                      <a:endParaRPr lang="en-US" sz="1400" dirty="0">
+                        <a:effectLst/>
+                      </a:endParaRPr>
+                    </a:p>
+                  </a:txBody>
+                  <a:tcPr marL="47625" marR="47625" marT="47625" marB="47625"/>
+                </a:tc>
+                <a:tc>
+                  <a:txBody>
+                    <a:bodyPr/>
+                    <a:lstStyle/>
+                    <a:p>
+                      <a:pPr algn="r" fontAlgn="t"/>
+                      <a:r>
+                        <a:rPr lang="en-US" sz="1400" dirty="0" smtClean="0">
+                          <a:effectLst/>
+                        </a:rPr>
+                        <a:t>5</a:t>
+                      </a:r>
+                      <a:endParaRPr lang="en-US" sz="1400" dirty="0">
+                        <a:effectLst/>
+                      </a:endParaRPr>
+                    </a:p>
+                  </a:txBody>
+                  <a:tcPr marL="47625" marR="47625" marT="47625" marB="47625"/>
+                </a:tc>
+                <a:tc>
+                  <a:txBody>
+                    <a:bodyPr/>
+                    <a:lstStyle/>
+                    <a:p>
+                      <a:pPr algn="r" fontAlgn="t"/>
+                      <a:r>
+                        <a:rPr lang="en-US" sz="1400" dirty="0" smtClean="0">
+                          <a:effectLst/>
+                        </a:rPr>
+                        <a:t>5</a:t>
+                      </a:r>
+                      <a:endParaRPr lang="en-US" sz="1400" dirty="0">
+                        <a:effectLst/>
+                      </a:endParaRPr>
+                    </a:p>
+                  </a:txBody>
+                  <a:tcPr marL="47625" marR="47625" marT="47625" marB="47625"/>
+                </a:tc>
+                <a:extLst>
+                  <a:ext uri="{0D108BD9-81ED-4DB2-BD59-A6C34878D82A}">
+                    <a16:rowId xmlns:a16="http://schemas.microsoft.com/office/drawing/2014/main" val="3178804965"/>
+                  </a:ext>
+                </a:extLst>
+              </a:tr>
+              <a:tr h="141717">
+                <a:tc>
+                  <a:txBody>
+                    <a:bodyPr/>
+                    <a:lstStyle/>
+                    <a:p>
+                      <a:pPr algn="l" fontAlgn="t"/>
+                      <a:r>
+                        <a:rPr lang="en-US" sz="1400" dirty="0" smtClean="0">
+                          <a:effectLst/>
+                        </a:rPr>
+                        <a:t>Yes</a:t>
+                      </a:r>
+                      <a:endParaRPr lang="en-US" sz="1400" dirty="0">
+                        <a:effectLst/>
+                      </a:endParaRPr>
+                    </a:p>
+                  </a:txBody>
+                  <a:tcPr marL="47625" marR="47625" marT="47625" marB="47625"/>
+                </a:tc>
+                <a:tc>
+                  <a:txBody>
+                    <a:bodyPr/>
+                    <a:lstStyle/>
+                    <a:p>
+                      <a:pPr algn="r" fontAlgn="t"/>
+                      <a:r>
+                        <a:rPr lang="en-US" sz="1400" dirty="0">
+                          <a:effectLst/>
+                        </a:rPr>
+                        <a:t>0</a:t>
+                      </a:r>
+                    </a:p>
+                  </a:txBody>
+                  <a:tcPr marL="47625" marR="47625" marT="47625" marB="47625"/>
+                </a:tc>
+                <a:tc>
+                  <a:txBody>
+                    <a:bodyPr/>
+                    <a:lstStyle/>
+                    <a:p>
+                      <a:pPr algn="r" fontAlgn="t"/>
+                      <a:r>
+                        <a:rPr lang="en-US" sz="1400" dirty="0">
+                          <a:effectLst/>
+                        </a:rPr>
+                        <a:t>0</a:t>
+                      </a:r>
+                    </a:p>
+                  </a:txBody>
+                  <a:tcPr marL="47625" marR="47625" marT="47625" marB="47625"/>
+                </a:tc>
+                <a:tc>
+                  <a:txBody>
+                    <a:bodyPr/>
+                    <a:lstStyle/>
+                    <a:p>
+                      <a:pPr algn="r" fontAlgn="t"/>
+                      <a:r>
+                        <a:rPr lang="en-US" sz="1400" dirty="0">
+                          <a:effectLst/>
+                        </a:rPr>
+                        <a:t>0</a:t>
+                      </a:r>
+                    </a:p>
+                  </a:txBody>
+                  <a:tcPr marL="47625" marR="47625" marT="47625" marB="47625"/>
+                </a:tc>
+                <a:tc>
+                  <a:txBody>
+                    <a:bodyPr/>
+                    <a:lstStyle/>
+                    <a:p>
+                      <a:pPr algn="r" fontAlgn="t"/>
+                      <a:r>
+                        <a:rPr lang="en-US" sz="1400" dirty="0" smtClean="0">
+                          <a:effectLst/>
+                        </a:rPr>
+                        <a:t>25</a:t>
+                      </a:r>
+                      <a:endParaRPr lang="en-US" sz="1400" dirty="0">
+                        <a:effectLst/>
+                      </a:endParaRPr>
+                    </a:p>
+                  </a:txBody>
+                  <a:tcPr marL="47625" marR="47625" marT="47625" marB="47625"/>
+                </a:tc>
+                <a:tc>
+                  <a:txBody>
+                    <a:bodyPr/>
+                    <a:lstStyle/>
+                    <a:p>
+                      <a:pPr algn="r" fontAlgn="t"/>
+                      <a:r>
+                        <a:rPr lang="en-US" sz="1400" dirty="0" smtClean="0">
+                          <a:effectLst/>
+                        </a:rPr>
+                        <a:t>21</a:t>
+                      </a:r>
+                      <a:endParaRPr lang="en-US" sz="1400" dirty="0">
+                        <a:effectLst/>
+                      </a:endParaRPr>
+                    </a:p>
+                  </a:txBody>
+                  <a:tcPr marL="47625" marR="47625" marT="47625" marB="47625"/>
+                </a:tc>
+                <a:tc>
+                  <a:txBody>
+                    <a:bodyPr/>
+                    <a:lstStyle/>
+                    <a:p>
+                      <a:pPr algn="r" fontAlgn="t"/>
+                      <a:r>
+                        <a:rPr lang="en-US" sz="1400" dirty="0" smtClean="0">
+                          <a:effectLst/>
+                        </a:rPr>
+                        <a:t>20</a:t>
+                      </a:r>
+                      <a:endParaRPr lang="en-US" sz="1400" dirty="0">
+                        <a:effectLst/>
+                      </a:endParaRPr>
+                    </a:p>
+                  </a:txBody>
+                  <a:tcPr marL="47625" marR="47625" marT="47625" marB="47625"/>
+                </a:tc>
+                <a:extLst>
+                  <a:ext uri="{0D108BD9-81ED-4DB2-BD59-A6C34878D82A}">
+                    <a16:rowId xmlns:a16="http://schemas.microsoft.com/office/drawing/2014/main" val="1128575523"/>
+                  </a:ext>
+                </a:extLst>
+              </a:tr>
+            </a:tbl>
+          </a:graphicData>
+        </a:graphic>
+      </p:graphicFrame>
+      <p:graphicFrame>
+        <p:nvGraphicFramePr>
+          <p:cNvPr id="11" name="Table 10"/>
+          <p:cNvGraphicFramePr>
+            <a:graphicFrameLocks noGrp="1"/>
+          </p:cNvGraphicFramePr>
+          <p:nvPr>
+            <p:extLst>
+              <p:ext uri="{D42A27DB-BD31-4B8C-83A1-F6EECF244321}">
+                <p14:modId xmlns:p14="http://schemas.microsoft.com/office/powerpoint/2010/main" val="309673232"/>
+              </p:ext>
+            </p:extLst>
+          </p:nvPr>
+        </p:nvGraphicFramePr>
+        <p:xfrm>
+          <a:off x="6302023" y="5476392"/>
+          <a:ext cx="5565289" cy="925830"/>
+        </p:xfrm>
+        <a:graphic>
+          <a:graphicData uri="http://schemas.openxmlformats.org/drawingml/2006/table">
+            <a:tbl>
+              <a:tblPr>
+                <a:tableStyleId>{5940675A-B579-460E-94D1-54222C63F5DA}</a:tableStyleId>
+              </a:tblPr>
+              <a:tblGrid>
+                <a:gridCol w="1280160">
+                  <a:extLst>
+                    <a:ext uri="{9D8B030D-6E8A-4147-A177-3AD203B41FA5}">
+                      <a16:colId xmlns:a16="http://schemas.microsoft.com/office/drawing/2014/main" val="1840728317"/>
+                    </a:ext>
+                  </a:extLst>
+                </a:gridCol>
+                <a:gridCol w="717176">
+                  <a:extLst>
+                    <a:ext uri="{9D8B030D-6E8A-4147-A177-3AD203B41FA5}">
+                      <a16:colId xmlns:a16="http://schemas.microsoft.com/office/drawing/2014/main" val="1320640928"/>
+                    </a:ext>
+                  </a:extLst>
+                </a:gridCol>
+                <a:gridCol w="681318">
+                  <a:extLst>
+                    <a:ext uri="{9D8B030D-6E8A-4147-A177-3AD203B41FA5}">
+                      <a16:colId xmlns:a16="http://schemas.microsoft.com/office/drawing/2014/main" val="2173811653"/>
+                    </a:ext>
+                  </a:extLst>
+                </a:gridCol>
+                <a:gridCol w="753035">
+                  <a:extLst>
+                    <a:ext uri="{9D8B030D-6E8A-4147-A177-3AD203B41FA5}">
+                      <a16:colId xmlns:a16="http://schemas.microsoft.com/office/drawing/2014/main" val="3796036014"/>
+                    </a:ext>
+                  </a:extLst>
+                </a:gridCol>
+                <a:gridCol w="528918">
+                  <a:extLst>
+                    <a:ext uri="{9D8B030D-6E8A-4147-A177-3AD203B41FA5}">
+                      <a16:colId xmlns:a16="http://schemas.microsoft.com/office/drawing/2014/main" val="1002921286"/>
+                    </a:ext>
+                  </a:extLst>
+                </a:gridCol>
+                <a:gridCol w="726141">
+                  <a:extLst>
+                    <a:ext uri="{9D8B030D-6E8A-4147-A177-3AD203B41FA5}">
+                      <a16:colId xmlns:a16="http://schemas.microsoft.com/office/drawing/2014/main" val="4269128020"/>
+                    </a:ext>
+                  </a:extLst>
+                </a:gridCol>
+                <a:gridCol w="878541">
+                  <a:extLst>
+                    <a:ext uri="{9D8B030D-6E8A-4147-A177-3AD203B41FA5}">
+                      <a16:colId xmlns:a16="http://schemas.microsoft.com/office/drawing/2014/main" val="787463210"/>
+                    </a:ext>
+                  </a:extLst>
+                </a:gridCol>
+              </a:tblGrid>
+              <a:tr h="299011">
+                <a:tc>
+                  <a:txBody>
+                    <a:bodyPr/>
+                    <a:lstStyle/>
+                    <a:p>
+                      <a:r>
+                        <a:rPr lang="en-US" sz="1400" dirty="0" smtClean="0"/>
+                        <a:t>Tumors Present</a:t>
+                      </a:r>
+                      <a:endParaRPr lang="en-US" sz="1400" dirty="0"/>
+                    </a:p>
+                  </a:txBody>
+                  <a:tcPr marL="47625" marR="47625" marT="47625" marB="47625" anchor="b"/>
+                </a:tc>
+                <a:tc>
+                  <a:txBody>
+                    <a:bodyPr/>
+                    <a:lstStyle/>
+                    <a:p>
+                      <a:pPr algn="r" fontAlgn="b"/>
+                      <a:r>
+                        <a:rPr lang="en-US" sz="1400" dirty="0" smtClean="0">
+                          <a:effectLst/>
+                        </a:rPr>
+                        <a:t>No </a:t>
+                      </a:r>
+                      <a:r>
+                        <a:rPr lang="en-US" sz="1400" dirty="0">
+                          <a:effectLst/>
+                        </a:rPr>
+                        <a:t>UVB</a:t>
+                      </a:r>
+                    </a:p>
+                  </a:txBody>
+                  <a:tcPr marL="47625" marR="47625" marT="47625" marB="47625" anchor="b"/>
+                </a:tc>
+                <a:tc>
+                  <a:txBody>
+                    <a:bodyPr/>
+                    <a:lstStyle/>
+                    <a:p>
+                      <a:pPr algn="r" fontAlgn="b"/>
+                      <a:r>
+                        <a:rPr lang="en-US" sz="1400" dirty="0">
+                          <a:effectLst/>
+                        </a:rPr>
+                        <a:t>UA only</a:t>
+                      </a:r>
+                    </a:p>
+                  </a:txBody>
+                  <a:tcPr marL="47625" marR="47625" marT="47625" marB="47625" anchor="b"/>
+                </a:tc>
+                <a:tc>
+                  <a:txBody>
+                    <a:bodyPr/>
+                    <a:lstStyle/>
+                    <a:p>
+                      <a:pPr algn="r" fontAlgn="b"/>
+                      <a:r>
+                        <a:rPr lang="en-US" sz="1400" dirty="0">
+                          <a:effectLst/>
+                        </a:rPr>
+                        <a:t>SFN only</a:t>
+                      </a:r>
+                    </a:p>
+                  </a:txBody>
+                  <a:tcPr marL="47625" marR="47625" marT="47625" marB="47625" anchor="b"/>
+                </a:tc>
+                <a:tc>
+                  <a:txBody>
+                    <a:bodyPr/>
+                    <a:lstStyle/>
+                    <a:p>
+                      <a:pPr algn="r" fontAlgn="b"/>
+                      <a:r>
+                        <a:rPr lang="en-US" sz="1400">
+                          <a:effectLst/>
+                        </a:rPr>
+                        <a:t>UVB</a:t>
+                      </a:r>
+                    </a:p>
+                  </a:txBody>
+                  <a:tcPr marL="47625" marR="47625" marT="47625" marB="47625" anchor="b"/>
+                </a:tc>
+                <a:tc>
+                  <a:txBody>
+                    <a:bodyPr/>
+                    <a:lstStyle/>
+                    <a:p>
+                      <a:pPr algn="r" fontAlgn="b"/>
+                      <a:r>
+                        <a:rPr lang="en-US" sz="1400">
+                          <a:effectLst/>
+                        </a:rPr>
+                        <a:t>UVB+UA</a:t>
+                      </a:r>
+                    </a:p>
+                  </a:txBody>
+                  <a:tcPr marL="47625" marR="47625" marT="47625" marB="47625" anchor="b"/>
+                </a:tc>
+                <a:tc>
+                  <a:txBody>
+                    <a:bodyPr/>
+                    <a:lstStyle/>
+                    <a:p>
+                      <a:pPr algn="r" fontAlgn="b"/>
+                      <a:r>
+                        <a:rPr lang="en-US" sz="1400" dirty="0">
+                          <a:effectLst/>
+                        </a:rPr>
+                        <a:t>UVB+SFN</a:t>
+                      </a:r>
+                    </a:p>
+                  </a:txBody>
+                  <a:tcPr marL="47625" marR="47625" marT="47625" marB="47625" anchor="b"/>
+                </a:tc>
+                <a:extLst>
+                  <a:ext uri="{0D108BD9-81ED-4DB2-BD59-A6C34878D82A}">
+                    <a16:rowId xmlns:a16="http://schemas.microsoft.com/office/drawing/2014/main" val="2930497339"/>
+                  </a:ext>
+                </a:extLst>
+              </a:tr>
+              <a:tr h="141717">
+                <a:tc>
+                  <a:txBody>
+                    <a:bodyPr/>
+                    <a:lstStyle/>
+                    <a:p>
+                      <a:pPr algn="l" fontAlgn="t"/>
+                      <a:r>
+                        <a:rPr lang="en-US" sz="1400" dirty="0" smtClean="0">
+                          <a:effectLst/>
+                        </a:rPr>
+                        <a:t>No</a:t>
+                      </a:r>
+                      <a:endParaRPr lang="en-US" sz="1400" dirty="0">
+                        <a:effectLst/>
+                      </a:endParaRPr>
+                    </a:p>
+                  </a:txBody>
+                  <a:tcPr marL="47625" marR="47625" marT="47625" marB="47625"/>
+                </a:tc>
+                <a:tc>
+                  <a:txBody>
+                    <a:bodyPr/>
+                    <a:lstStyle/>
+                    <a:p>
+                      <a:pPr algn="r" fontAlgn="t"/>
+                      <a:r>
+                        <a:rPr lang="en-US" sz="1400" dirty="0">
+                          <a:effectLst/>
+                        </a:rPr>
+                        <a:t>6</a:t>
+                      </a:r>
+                    </a:p>
+                  </a:txBody>
+                  <a:tcPr marL="47625" marR="47625" marT="47625" marB="47625"/>
+                </a:tc>
+                <a:tc>
+                  <a:txBody>
+                    <a:bodyPr/>
+                    <a:lstStyle/>
+                    <a:p>
+                      <a:pPr algn="r" fontAlgn="t"/>
+                      <a:r>
+                        <a:rPr lang="en-US" sz="1400" dirty="0">
+                          <a:effectLst/>
+                        </a:rPr>
+                        <a:t>6</a:t>
+                      </a:r>
+                    </a:p>
+                  </a:txBody>
+                  <a:tcPr marL="47625" marR="47625" marT="47625" marB="47625"/>
+                </a:tc>
+                <a:tc>
+                  <a:txBody>
+                    <a:bodyPr/>
+                    <a:lstStyle/>
+                    <a:p>
+                      <a:pPr algn="r" fontAlgn="t"/>
+                      <a:r>
+                        <a:rPr lang="en-US" sz="1400" dirty="0">
+                          <a:effectLst/>
+                        </a:rPr>
+                        <a:t>6</a:t>
+                      </a:r>
+                    </a:p>
+                  </a:txBody>
+                  <a:tcPr marL="47625" marR="47625" marT="47625" marB="47625"/>
+                </a:tc>
+                <a:tc>
+                  <a:txBody>
+                    <a:bodyPr/>
+                    <a:lstStyle/>
+                    <a:p>
+                      <a:pPr algn="r" fontAlgn="t"/>
+                      <a:r>
+                        <a:rPr lang="en-US" sz="1400" dirty="0">
+                          <a:effectLst/>
+                        </a:rPr>
+                        <a:t>0</a:t>
+                      </a:r>
+                    </a:p>
+                  </a:txBody>
+                  <a:tcPr marL="47625" marR="47625" marT="47625" marB="47625"/>
+                </a:tc>
+                <a:tc>
+                  <a:txBody>
+                    <a:bodyPr/>
+                    <a:lstStyle/>
+                    <a:p>
+                      <a:pPr algn="r" fontAlgn="t"/>
+                      <a:r>
+                        <a:rPr lang="en-US" sz="1400">
+                          <a:effectLst/>
+                        </a:rPr>
+                        <a:t>0</a:t>
+                      </a:r>
+                    </a:p>
+                  </a:txBody>
+                  <a:tcPr marL="47625" marR="47625" marT="47625" marB="47625"/>
+                </a:tc>
+                <a:tc>
+                  <a:txBody>
+                    <a:bodyPr/>
+                    <a:lstStyle/>
+                    <a:p>
+                      <a:pPr algn="r" fontAlgn="t"/>
+                      <a:r>
+                        <a:rPr lang="en-US" sz="1400">
+                          <a:effectLst/>
+                        </a:rPr>
+                        <a:t>5</a:t>
+                      </a:r>
+                    </a:p>
+                  </a:txBody>
+                  <a:tcPr marL="47625" marR="47625" marT="47625" marB="47625"/>
+                </a:tc>
+                <a:extLst>
+                  <a:ext uri="{0D108BD9-81ED-4DB2-BD59-A6C34878D82A}">
+                    <a16:rowId xmlns:a16="http://schemas.microsoft.com/office/drawing/2014/main" val="3178804965"/>
+                  </a:ext>
+                </a:extLst>
+              </a:tr>
+              <a:tr h="141717">
+                <a:tc>
+                  <a:txBody>
+                    <a:bodyPr/>
+                    <a:lstStyle/>
+                    <a:p>
+                      <a:pPr algn="l" fontAlgn="t"/>
+                      <a:r>
+                        <a:rPr lang="en-US" sz="1400" dirty="0" smtClean="0">
+                          <a:effectLst/>
+                        </a:rPr>
+                        <a:t>Yes</a:t>
+                      </a:r>
+                      <a:endParaRPr lang="en-US" sz="1400" dirty="0">
+                        <a:effectLst/>
+                      </a:endParaRPr>
+                    </a:p>
+                  </a:txBody>
+                  <a:tcPr marL="47625" marR="47625" marT="47625" marB="47625"/>
+                </a:tc>
+                <a:tc>
+                  <a:txBody>
+                    <a:bodyPr/>
+                    <a:lstStyle/>
+                    <a:p>
+                      <a:pPr algn="r" fontAlgn="t"/>
+                      <a:r>
+                        <a:rPr lang="en-US" sz="1400">
+                          <a:effectLst/>
+                        </a:rPr>
+                        <a:t>0</a:t>
+                      </a:r>
+                    </a:p>
+                  </a:txBody>
+                  <a:tcPr marL="47625" marR="47625" marT="47625" marB="47625"/>
+                </a:tc>
+                <a:tc>
+                  <a:txBody>
+                    <a:bodyPr/>
+                    <a:lstStyle/>
+                    <a:p>
+                      <a:pPr algn="r" fontAlgn="t"/>
+                      <a:r>
+                        <a:rPr lang="en-US" sz="1400" dirty="0">
+                          <a:effectLst/>
+                        </a:rPr>
+                        <a:t>0</a:t>
+                      </a:r>
+                    </a:p>
+                  </a:txBody>
+                  <a:tcPr marL="47625" marR="47625" marT="47625" marB="47625"/>
+                </a:tc>
+                <a:tc>
+                  <a:txBody>
+                    <a:bodyPr/>
+                    <a:lstStyle/>
+                    <a:p>
+                      <a:pPr algn="r" fontAlgn="t"/>
+                      <a:r>
+                        <a:rPr lang="en-US" sz="1400" dirty="0">
+                          <a:effectLst/>
+                        </a:rPr>
+                        <a:t>0</a:t>
+                      </a:r>
+                    </a:p>
+                  </a:txBody>
+                  <a:tcPr marL="47625" marR="47625" marT="47625" marB="47625"/>
+                </a:tc>
+                <a:tc>
+                  <a:txBody>
+                    <a:bodyPr/>
+                    <a:lstStyle/>
+                    <a:p>
+                      <a:pPr algn="r" fontAlgn="t"/>
+                      <a:r>
+                        <a:rPr lang="en-US" sz="1400">
+                          <a:effectLst/>
+                        </a:rPr>
+                        <a:t>26</a:t>
+                      </a:r>
+                    </a:p>
+                  </a:txBody>
+                  <a:tcPr marL="47625" marR="47625" marT="47625" marB="47625"/>
+                </a:tc>
+                <a:tc>
+                  <a:txBody>
+                    <a:bodyPr/>
+                    <a:lstStyle/>
+                    <a:p>
+                      <a:pPr algn="r" fontAlgn="t"/>
+                      <a:r>
+                        <a:rPr lang="en-US" sz="1400" dirty="0">
+                          <a:effectLst/>
+                        </a:rPr>
+                        <a:t>26</a:t>
+                      </a:r>
+                    </a:p>
+                  </a:txBody>
+                  <a:tcPr marL="47625" marR="47625" marT="47625" marB="47625"/>
+                </a:tc>
+                <a:tc>
+                  <a:txBody>
+                    <a:bodyPr/>
+                    <a:lstStyle/>
+                    <a:p>
+                      <a:pPr algn="r" fontAlgn="t"/>
+                      <a:r>
+                        <a:rPr lang="en-US" sz="1400" dirty="0">
+                          <a:effectLst/>
+                        </a:rPr>
+                        <a:t>20</a:t>
+                      </a:r>
+                    </a:p>
+                  </a:txBody>
+                  <a:tcPr marL="47625" marR="47625" marT="47625" marB="47625"/>
+                </a:tc>
+                <a:extLst>
+                  <a:ext uri="{0D108BD9-81ED-4DB2-BD59-A6C34878D82A}">
+                    <a16:rowId xmlns:a16="http://schemas.microsoft.com/office/drawing/2014/main" val="1128575523"/>
+                  </a:ext>
+                </a:extLst>
+              </a:tr>
+            </a:tbl>
+          </a:graphicData>
+        </a:graphic>
+      </p:graphicFrame>
     </p:spTree>
     <p:extLst>
       <p:ext uri="{BB962C8B-B14F-4D97-AF65-F5344CB8AC3E}">
@@ -4126,6 +5698,236 @@
 </file>
 
 <file path=ppt/slides/slide4.xml><?xml version="1.0" encoding="utf-8"?>
+<p:sld xmlns:a="http://schemas.openxmlformats.org/drawingml/2006/main" xmlns:r="http://schemas.openxmlformats.org/officeDocument/2006/relationships" xmlns:p="http://schemas.openxmlformats.org/presentationml/2006/main">
+  <p:cSld>
+    <p:spTree>
+      <p:nvGrpSpPr>
+        <p:cNvPr id="1" name=""/>
+        <p:cNvGrpSpPr/>
+        <p:nvPr/>
+      </p:nvGrpSpPr>
+      <p:grpSpPr>
+        <a:xfrm>
+          <a:off x="0" y="0"/>
+          <a:ext cx="0" cy="0"/>
+          <a:chOff x="0" y="0"/>
+          <a:chExt cx="0" cy="0"/>
+        </a:xfrm>
+      </p:grpSpPr>
+      <p:sp>
+        <p:nvSpPr>
+          <p:cNvPr id="2" name="Title 1"/>
+          <p:cNvSpPr>
+            <a:spLocks noGrp="1"/>
+          </p:cNvSpPr>
+          <p:nvPr>
+            <p:ph type="title"/>
+          </p:nvPr>
+        </p:nvSpPr>
+        <p:spPr>
+          <a:xfrm>
+            <a:off x="838200" y="365125"/>
+            <a:ext cx="10515600" cy="685077"/>
+          </a:xfrm>
+        </p:spPr>
+        <p:txBody>
+          <a:bodyPr>
+            <a:normAutofit fontScale="90000"/>
+          </a:bodyPr>
+          <a:lstStyle/>
+          <a:p>
+            <a:pPr algn="ctr"/>
+            <a:r>
+              <a:rPr lang="en-US" dirty="0" smtClean="0"/>
+              <a:t>Tumor Total Volume </a:t>
+            </a:r>
+            <a:r>
+              <a:rPr lang="en-US" dirty="0"/>
+              <a:t>vs. Number of Tumors</a:t>
+            </a:r>
+          </a:p>
+        </p:txBody>
+      </p:sp>
+      <p:sp>
+        <p:nvSpPr>
+          <p:cNvPr id="4" name="Slide Number Placeholder 3"/>
+          <p:cNvSpPr>
+            <a:spLocks noGrp="1"/>
+          </p:cNvSpPr>
+          <p:nvPr>
+            <p:ph type="sldNum" sz="quarter" idx="12"/>
+          </p:nvPr>
+        </p:nvSpPr>
+        <p:spPr/>
+        <p:txBody>
+          <a:bodyPr/>
+          <a:lstStyle/>
+          <a:p>
+            <a:fld id="{C6028E65-7989-4318-8A09-D88C034A7CD7}" type="slidenum">
+              <a:rPr lang="en-US" smtClean="0"/>
+              <a:t>4</a:t>
+            </a:fld>
+            <a:endParaRPr lang="en-US"/>
+          </a:p>
+        </p:txBody>
+      </p:sp>
+      <p:pic>
+        <p:nvPicPr>
+          <p:cNvPr id="9" name="Picture 8"/>
+          <p:cNvPicPr>
+            <a:picLocks noChangeAspect="1"/>
+          </p:cNvPicPr>
+          <p:nvPr/>
+        </p:nvPicPr>
+        <p:blipFill>
+          <a:blip r:embed="rId2" cstate="print">
+            <a:extLst>
+              <a:ext uri="{28A0092B-C50C-407E-A947-70E740481C1C}">
+                <a14:useLocalDpi xmlns:a14="http://schemas.microsoft.com/office/drawing/2010/main" val="0"/>
+              </a:ext>
+            </a:extLst>
+          </a:blip>
+          <a:stretch>
+            <a:fillRect/>
+          </a:stretch>
+        </p:blipFill>
+        <p:spPr>
+          <a:xfrm>
+            <a:off x="1524000" y="1050202"/>
+            <a:ext cx="9144000" cy="5486400"/>
+          </a:xfrm>
+          <a:prstGeom prst="rect">
+            <a:avLst/>
+          </a:prstGeom>
+        </p:spPr>
+      </p:pic>
+    </p:spTree>
+    <p:extLst>
+      <p:ext uri="{BB962C8B-B14F-4D97-AF65-F5344CB8AC3E}">
+        <p14:creationId xmlns:p14="http://schemas.microsoft.com/office/powerpoint/2010/main" val="712605724"/>
+      </p:ext>
+    </p:extLst>
+  </p:cSld>
+  <p:clrMapOvr>
+    <a:masterClrMapping/>
+  </p:clrMapOvr>
+</p:sld>
+</file>
+
+<file path=ppt/slides/slide5.xml><?xml version="1.0" encoding="utf-8"?>
+<p:sld xmlns:a="http://schemas.openxmlformats.org/drawingml/2006/main" xmlns:r="http://schemas.openxmlformats.org/officeDocument/2006/relationships" xmlns:p="http://schemas.openxmlformats.org/presentationml/2006/main">
+  <p:cSld>
+    <p:spTree>
+      <p:nvGrpSpPr>
+        <p:cNvPr id="1" name=""/>
+        <p:cNvGrpSpPr/>
+        <p:nvPr/>
+      </p:nvGrpSpPr>
+      <p:grpSpPr>
+        <a:xfrm>
+          <a:off x="0" y="0"/>
+          <a:ext cx="0" cy="0"/>
+          <a:chOff x="0" y="0"/>
+          <a:chExt cx="0" cy="0"/>
+        </a:xfrm>
+      </p:grpSpPr>
+      <p:sp>
+        <p:nvSpPr>
+          <p:cNvPr id="2" name="Title 1"/>
+          <p:cNvSpPr>
+            <a:spLocks noGrp="1"/>
+          </p:cNvSpPr>
+          <p:nvPr>
+            <p:ph type="title"/>
+          </p:nvPr>
+        </p:nvSpPr>
+        <p:spPr>
+          <a:xfrm>
+            <a:off x="838200" y="365125"/>
+            <a:ext cx="10515600" cy="685077"/>
+          </a:xfrm>
+        </p:spPr>
+        <p:txBody>
+          <a:bodyPr>
+            <a:normAutofit fontScale="90000"/>
+          </a:bodyPr>
+          <a:lstStyle/>
+          <a:p>
+            <a:pPr algn="ctr"/>
+            <a:r>
+              <a:rPr lang="en-US" dirty="0"/>
+              <a:t>Average Tumor Size vs. Number of Tumors</a:t>
+            </a:r>
+          </a:p>
+        </p:txBody>
+      </p:sp>
+      <p:sp>
+        <p:nvSpPr>
+          <p:cNvPr id="4" name="Slide Number Placeholder 3"/>
+          <p:cNvSpPr>
+            <a:spLocks noGrp="1"/>
+          </p:cNvSpPr>
+          <p:nvPr>
+            <p:ph type="sldNum" sz="quarter" idx="12"/>
+          </p:nvPr>
+        </p:nvSpPr>
+        <p:spPr/>
+        <p:txBody>
+          <a:bodyPr/>
+          <a:lstStyle/>
+          <a:p>
+            <a:fld id="{C6028E65-7989-4318-8A09-D88C034A7CD7}" type="slidenum">
+              <a:rPr lang="en-US" smtClean="0"/>
+              <a:t>5</a:t>
+            </a:fld>
+            <a:endParaRPr lang="en-US"/>
+          </a:p>
+        </p:txBody>
+      </p:sp>
+      <p:pic>
+        <p:nvPicPr>
+          <p:cNvPr id="8" name="Picture 7"/>
+          <p:cNvPicPr>
+            <a:picLocks noChangeAspect="1"/>
+          </p:cNvPicPr>
+          <p:nvPr/>
+        </p:nvPicPr>
+        <p:blipFill>
+          <a:blip r:embed="rId2" cstate="print">
+            <a:extLst>
+              <a:ext uri="{28A0092B-C50C-407E-A947-70E740481C1C}">
+                <a14:useLocalDpi xmlns:a14="http://schemas.microsoft.com/office/drawing/2010/main" val="0"/>
+              </a:ext>
+            </a:extLst>
+          </a:blip>
+          <a:stretch>
+            <a:fillRect/>
+          </a:stretch>
+        </p:blipFill>
+        <p:spPr>
+          <a:xfrm>
+            <a:off x="1524000" y="1052512"/>
+            <a:ext cx="9144000" cy="5486400"/>
+          </a:xfrm>
+          <a:prstGeom prst="rect">
+            <a:avLst/>
+          </a:prstGeom>
+        </p:spPr>
+      </p:pic>
+    </p:spTree>
+    <p:extLst>
+      <p:ext uri="{BB962C8B-B14F-4D97-AF65-F5344CB8AC3E}">
+        <p14:creationId xmlns:p14="http://schemas.microsoft.com/office/powerpoint/2010/main" val="3652068652"/>
+      </p:ext>
+    </p:extLst>
+  </p:cSld>
+  <p:clrMapOvr>
+    <a:masterClrMapping/>
+  </p:clrMapOvr>
+</p:sld>
+</file>
+
+<file path=ppt/slides/slide6.xml><?xml version="1.0" encoding="utf-8"?>
 <p:sld xmlns:a="http://schemas.openxmlformats.org/drawingml/2006/main" xmlns:r="http://schemas.openxmlformats.org/officeDocument/2006/relationships" xmlns:p="http://schemas.openxmlformats.org/presentationml/2006/main">
   <p:cSld>
     <p:spTree>
@@ -4707,7 +6509,7 @@
           <a:p>
             <a:fld id="{C6028E65-7989-4318-8A09-D88C034A7CD7}" type="slidenum">
               <a:rPr lang="en-US" smtClean="0"/>
-              <a:t>4</a:t>
+              <a:t>6</a:t>
             </a:fld>
             <a:endParaRPr lang="en-US"/>
           </a:p>
@@ -4726,7 +6528,7 @@
 </p:sld>
 </file>
 
-<file path=ppt/slides/slide5.xml><?xml version="1.0" encoding="utf-8"?>
+<file path=ppt/slides/slide7.xml><?xml version="1.0" encoding="utf-8"?>
 <p:sld xmlns:a="http://schemas.openxmlformats.org/drawingml/2006/main" xmlns:r="http://schemas.openxmlformats.org/officeDocument/2006/relationships" xmlns:p="http://schemas.openxmlformats.org/presentationml/2006/main">
   <p:cSld>
     <p:spTree>
@@ -4755,8 +6557,8 @@
         </p:nvSpPr>
         <p:spPr>
           <a:xfrm>
-            <a:off x="537883" y="365125"/>
-            <a:ext cx="11273117" cy="1325563"/>
+            <a:off x="537883" y="233083"/>
+            <a:ext cx="11273117" cy="1002934"/>
           </a:xfrm>
         </p:spPr>
         <p:txBody>
@@ -4802,7 +6604,7 @@
         </p:blipFill>
         <p:spPr>
           <a:xfrm>
-            <a:off x="3655383" y="1779492"/>
+            <a:off x="3655383" y="1523196"/>
             <a:ext cx="3622629" cy="4033932"/>
           </a:xfrm>
           <a:prstGeom prst="rect">
@@ -4832,7 +6634,7 @@
         </p:blipFill>
         <p:spPr>
           <a:xfrm>
-            <a:off x="7198480" y="1780042"/>
+            <a:off x="7177381" y="1521964"/>
             <a:ext cx="4839399" cy="4032832"/>
           </a:xfrm>
           <a:prstGeom prst="rect">
@@ -4861,7 +6663,7 @@
         </p:blipFill>
         <p:spPr>
           <a:xfrm>
-            <a:off x="0" y="1779492"/>
+            <a:off x="0" y="1521965"/>
             <a:ext cx="3655383" cy="4035163"/>
           </a:xfrm>
           <a:prstGeom prst="rect">
@@ -4885,7 +6687,7 @@
         </p:blipFill>
         <p:spPr>
           <a:xfrm>
-            <a:off x="3655383" y="5843077"/>
+            <a:off x="3658142" y="5645730"/>
             <a:ext cx="3543097" cy="644544"/>
           </a:xfrm>
           <a:prstGeom prst="rect">
@@ -4901,7 +6703,7 @@
         </p:nvSpPr>
         <p:spPr>
           <a:xfrm>
-            <a:off x="3655383" y="1690688"/>
+            <a:off x="3655382" y="1521965"/>
             <a:ext cx="3543097" cy="4796933"/>
           </a:xfrm>
           <a:prstGeom prst="rect">
@@ -4956,8 +6758,78 @@
           <a:p>
             <a:fld id="{C6028E65-7989-4318-8A09-D88C034A7CD7}" type="slidenum">
               <a:rPr lang="en-US" smtClean="0"/>
-              <a:t>5</a:t>
+              <a:t>7</a:t>
             </a:fld>
+            <a:endParaRPr lang="en-US"/>
+          </a:p>
+        </p:txBody>
+      </p:sp>
+      <p:pic>
+        <p:nvPicPr>
+          <p:cNvPr id="3" name="Picture 2"/>
+          <p:cNvPicPr>
+            <a:picLocks noChangeAspect="1"/>
+          </p:cNvPicPr>
+          <p:nvPr/>
+        </p:nvPicPr>
+        <p:blipFill>
+          <a:blip r:embed="rId6"/>
+          <a:stretch>
+            <a:fillRect/>
+          </a:stretch>
+        </p:blipFill>
+        <p:spPr>
+          <a:xfrm>
+            <a:off x="7278012" y="5618059"/>
+            <a:ext cx="3587212" cy="652567"/>
+          </a:xfrm>
+          <a:prstGeom prst="rect">
+            <a:avLst/>
+          </a:prstGeom>
+        </p:spPr>
+      </p:pic>
+      <p:sp>
+        <p:nvSpPr>
+          <p:cNvPr id="12" name="Rectangle 11"/>
+          <p:cNvSpPr/>
+          <p:nvPr/>
+        </p:nvSpPr>
+        <p:spPr>
+          <a:xfrm>
+            <a:off x="7240676" y="1521964"/>
+            <a:ext cx="3624548" cy="4796933"/>
+          </a:xfrm>
+          <a:prstGeom prst="rect">
+            <a:avLst/>
+          </a:prstGeom>
+          <a:noFill/>
+          <a:ln w="38100">
+            <a:solidFill>
+              <a:srgbClr val="C00000"/>
+            </a:solidFill>
+          </a:ln>
+        </p:spPr>
+        <p:style>
+          <a:lnRef idx="2">
+            <a:schemeClr val="accent1">
+              <a:shade val="50000"/>
+            </a:schemeClr>
+          </a:lnRef>
+          <a:fillRef idx="1">
+            <a:schemeClr val="accent1"/>
+          </a:fillRef>
+          <a:effectRef idx="0">
+            <a:schemeClr val="accent1"/>
+          </a:effectRef>
+          <a:fontRef idx="minor">
+            <a:schemeClr val="lt1"/>
+          </a:fontRef>
+        </p:style>
+        <p:txBody>
+          <a:bodyPr rtlCol="0" anchor="ctr"/>
+          <a:lstStyle/>
+          <a:p>
+            <a:pPr algn="ctr"/>
             <a:endParaRPr lang="en-US"/>
           </a:p>
         </p:txBody>
@@ -4975,7 +6847,7 @@
 </p:sld>
 </file>
 
-<file path=ppt/slides/slide6.xml><?xml version="1.0" encoding="utf-8"?>
+<file path=ppt/slides/slide8.xml><?xml version="1.0" encoding="utf-8"?>
 <p:sld xmlns:a="http://schemas.openxmlformats.org/drawingml/2006/main" xmlns:r="http://schemas.openxmlformats.org/officeDocument/2006/relationships" xmlns:p="http://schemas.openxmlformats.org/presentationml/2006/main">
   <p:cSld>
     <p:spTree>
@@ -5004,99 +6876,54 @@
         </p:nvSpPr>
         <p:spPr>
           <a:xfrm>
-            <a:off x="838200" y="365126"/>
-            <a:ext cx="10515600" cy="970616"/>
+            <a:off x="838200" y="365125"/>
+            <a:ext cx="10515600" cy="477557"/>
           </a:xfrm>
         </p:spPr>
         <p:txBody>
-          <a:bodyPr/>
+          <a:bodyPr>
+            <a:normAutofit fontScale="90000"/>
+          </a:bodyPr>
           <a:lstStyle/>
           <a:p>
             <a:pPr algn="ctr"/>
             <a:r>
               <a:rPr lang="en-US" dirty="0" smtClean="0"/>
-              <a:t>Conclusion</a:t>
+              <a:t>Week 22</a:t>
             </a:r>
             <a:endParaRPr lang="en-US" dirty="0"/>
           </a:p>
         </p:txBody>
       </p:sp>
-      <p:sp>
-        <p:nvSpPr>
-          <p:cNvPr id="3" name="Content Placeholder 2"/>
-          <p:cNvSpPr>
-            <a:spLocks noGrp="1"/>
-          </p:cNvSpPr>
+      <p:pic>
+        <p:nvPicPr>
+          <p:cNvPr id="5" name="Content Placeholder 4"/>
+          <p:cNvPicPr>
+            <a:picLocks noGrp="1" noChangeAspect="1"/>
+          </p:cNvPicPr>
           <p:nvPr>
             <p:ph idx="1"/>
           </p:nvPr>
-        </p:nvSpPr>
+        </p:nvPicPr>
+        <p:blipFill>
+          <a:blip r:embed="rId2" cstate="print">
+            <a:extLst>
+              <a:ext uri="{28A0092B-C50C-407E-A947-70E740481C1C}">
+                <a14:useLocalDpi xmlns:a14="http://schemas.microsoft.com/office/drawing/2010/main" val="0"/>
+              </a:ext>
+            </a:extLst>
+          </a:blip>
+          <a:stretch>
+            <a:fillRect/>
+          </a:stretch>
+        </p:blipFill>
         <p:spPr>
           <a:xfrm>
-            <a:off x="838200" y="1577788"/>
-            <a:ext cx="10515600" cy="4599175"/>
+            <a:off x="227082" y="1549367"/>
+            <a:ext cx="3851878" cy="3209898"/>
           </a:xfrm>
         </p:spPr>
-        <p:txBody>
-          <a:bodyPr>
-            <a:normAutofit/>
-          </a:bodyPr>
-          <a:lstStyle/>
-          <a:p>
-            <a:pPr>
-              <a:buFont typeface="Wingdings" panose="05000000000000000000" pitchFamily="2" charset="2"/>
-              <a:buChar char="Ø"/>
-            </a:pPr>
-            <a:r>
-              <a:rPr lang="en-US" dirty="0" smtClean="0"/>
-              <a:t>Number and size of most tumors monotonically increased over the period of 24 weeks in all 3 UVB-treated groups.</a:t>
-            </a:r>
-          </a:p>
-          <a:p>
-            <a:pPr>
-              <a:buFont typeface="Wingdings" panose="05000000000000000000" pitchFamily="2" charset="2"/>
-              <a:buChar char="Ø"/>
-            </a:pPr>
-            <a:r>
-              <a:rPr lang="en-US" dirty="0" smtClean="0"/>
-              <a:t>At the end of the study (last measurement taken at Week 24):</a:t>
-            </a:r>
-          </a:p>
-          <a:p>
-            <a:pPr lvl="1"/>
-            <a:r>
-              <a:rPr lang="en-US" dirty="0" smtClean="0"/>
-              <a:t>UVB+SFN group had </a:t>
-            </a:r>
-            <a:r>
-              <a:rPr lang="en-US" b="1" dirty="0" smtClean="0"/>
-              <a:t>significantly</a:t>
-            </a:r>
-            <a:r>
-              <a:rPr lang="en-US" dirty="0" smtClean="0"/>
-              <a:t> smaller number of tumors compared to the UA and SFN treated groups (p-value of ANOVA &lt; 0.001). UVB+UA was borderline-significant (p-value = 0.086).</a:t>
-            </a:r>
-          </a:p>
-          <a:p>
-            <a:pPr lvl="1"/>
-            <a:r>
-              <a:rPr lang="en-US" dirty="0" smtClean="0"/>
-              <a:t>If animals with no tumors are taken into account, UVB+SFN group on average had significantly smaller tumors compared to UVB-Only and UVB+SFN groups (p-value = 0.03).</a:t>
-            </a:r>
-          </a:p>
-          <a:p>
-            <a:pPr>
-              <a:buFont typeface="Wingdings" panose="05000000000000000000" pitchFamily="2" charset="2"/>
-              <a:buChar char="Ø"/>
-            </a:pPr>
-            <a:r>
-              <a:rPr lang="en-US" dirty="0" smtClean="0"/>
-              <a:t>UVB+UA also had more animals with tumors (26 out of 26) compared to UVB+SFN group (20 out of 25), same as UVB-Only (26 out of 26).</a:t>
-            </a:r>
-            <a:endParaRPr lang="en-US" dirty="0"/>
-          </a:p>
-        </p:txBody>
-      </p:sp>
+      </p:pic>
       <p:sp>
         <p:nvSpPr>
           <p:cNvPr id="4" name="Slide Number Placeholder 3"/>
@@ -5114,16 +6941,393 @@
           <a:p>
             <a:fld id="{C6028E65-7989-4318-8A09-D88C034A7CD7}" type="slidenum">
               <a:rPr lang="en-US" smtClean="0"/>
-              <a:t>6</a:t>
+              <a:t>8</a:t>
             </a:fld>
             <a:endParaRPr lang="en-US"/>
           </a:p>
         </p:txBody>
       </p:sp>
+      <p:pic>
+        <p:nvPicPr>
+          <p:cNvPr id="6" name="Picture 5"/>
+          <p:cNvPicPr>
+            <a:picLocks noChangeAspect="1"/>
+          </p:cNvPicPr>
+          <p:nvPr/>
+        </p:nvPicPr>
+        <p:blipFill>
+          <a:blip r:embed="rId3"/>
+          <a:stretch>
+            <a:fillRect/>
+          </a:stretch>
+        </p:blipFill>
+        <p:spPr>
+          <a:xfrm>
+            <a:off x="227081" y="5289178"/>
+            <a:ext cx="3851879" cy="700714"/>
+          </a:xfrm>
+          <a:prstGeom prst="rect">
+            <a:avLst/>
+          </a:prstGeom>
+        </p:spPr>
+      </p:pic>
+      <p:pic>
+        <p:nvPicPr>
+          <p:cNvPr id="7" name="Picture 6"/>
+          <p:cNvPicPr>
+            <a:picLocks noChangeAspect="1"/>
+          </p:cNvPicPr>
+          <p:nvPr/>
+        </p:nvPicPr>
+        <p:blipFill>
+          <a:blip r:embed="rId4" cstate="print">
+            <a:extLst>
+              <a:ext uri="{28A0092B-C50C-407E-A947-70E740481C1C}">
+                <a14:useLocalDpi xmlns:a14="http://schemas.microsoft.com/office/drawing/2010/main" val="0"/>
+              </a:ext>
+            </a:extLst>
+          </a:blip>
+          <a:stretch>
+            <a:fillRect/>
+          </a:stretch>
+        </p:blipFill>
+        <p:spPr>
+          <a:xfrm>
+            <a:off x="4192502" y="1549367"/>
+            <a:ext cx="3851876" cy="3209897"/>
+          </a:xfrm>
+          <a:prstGeom prst="rect">
+            <a:avLst/>
+          </a:prstGeom>
+        </p:spPr>
+      </p:pic>
+      <p:pic>
+        <p:nvPicPr>
+          <p:cNvPr id="8" name="Picture 7"/>
+          <p:cNvPicPr>
+            <a:picLocks noChangeAspect="1"/>
+          </p:cNvPicPr>
+          <p:nvPr/>
+        </p:nvPicPr>
+        <p:blipFill>
+          <a:blip r:embed="rId5"/>
+          <a:stretch>
+            <a:fillRect/>
+          </a:stretch>
+        </p:blipFill>
+        <p:spPr>
+          <a:xfrm>
+            <a:off x="4192502" y="5289178"/>
+            <a:ext cx="3851876" cy="700714"/>
+          </a:xfrm>
+          <a:prstGeom prst="rect">
+            <a:avLst/>
+          </a:prstGeom>
+        </p:spPr>
+      </p:pic>
+      <p:pic>
+        <p:nvPicPr>
+          <p:cNvPr id="9" name="Picture 8"/>
+          <p:cNvPicPr>
+            <a:picLocks noChangeAspect="1"/>
+          </p:cNvPicPr>
+          <p:nvPr/>
+        </p:nvPicPr>
+        <p:blipFill>
+          <a:blip r:embed="rId6" cstate="print">
+            <a:extLst>
+              <a:ext uri="{28A0092B-C50C-407E-A947-70E740481C1C}">
+                <a14:useLocalDpi xmlns:a14="http://schemas.microsoft.com/office/drawing/2010/main" val="0"/>
+              </a:ext>
+            </a:extLst>
+          </a:blip>
+          <a:stretch>
+            <a:fillRect/>
+          </a:stretch>
+        </p:blipFill>
+        <p:spPr>
+          <a:xfrm>
+            <a:off x="8157920" y="1549367"/>
+            <a:ext cx="3851876" cy="3209897"/>
+          </a:xfrm>
+          <a:prstGeom prst="rect">
+            <a:avLst/>
+          </a:prstGeom>
+        </p:spPr>
+      </p:pic>
+      <p:pic>
+        <p:nvPicPr>
+          <p:cNvPr id="10" name="Picture 9"/>
+          <p:cNvPicPr>
+            <a:picLocks noChangeAspect="1"/>
+          </p:cNvPicPr>
+          <p:nvPr/>
+        </p:nvPicPr>
+        <p:blipFill>
+          <a:blip r:embed="rId7"/>
+          <a:stretch>
+            <a:fillRect/>
+          </a:stretch>
+        </p:blipFill>
+        <p:spPr>
+          <a:xfrm>
+            <a:off x="8157920" y="5289178"/>
+            <a:ext cx="3851876" cy="700714"/>
+          </a:xfrm>
+          <a:prstGeom prst="rect">
+            <a:avLst/>
+          </a:prstGeom>
+        </p:spPr>
+      </p:pic>
     </p:spTree>
     <p:extLst>
       <p:ext uri="{BB962C8B-B14F-4D97-AF65-F5344CB8AC3E}">
-        <p14:creationId xmlns:p14="http://schemas.microsoft.com/office/powerpoint/2010/main" val="2462010119"/>
+        <p14:creationId xmlns:p14="http://schemas.microsoft.com/office/powerpoint/2010/main" val="944619693"/>
+      </p:ext>
+    </p:extLst>
+  </p:cSld>
+  <p:clrMapOvr>
+    <a:masterClrMapping/>
+  </p:clrMapOvr>
+</p:sld>
+</file>
+
+<file path=ppt/slides/slide9.xml><?xml version="1.0" encoding="utf-8"?>
+<p:sld xmlns:a="http://schemas.openxmlformats.org/drawingml/2006/main" xmlns:r="http://schemas.openxmlformats.org/officeDocument/2006/relationships" xmlns:p="http://schemas.openxmlformats.org/presentationml/2006/main">
+  <p:cSld>
+    <p:spTree>
+      <p:nvGrpSpPr>
+        <p:cNvPr id="1" name=""/>
+        <p:cNvGrpSpPr/>
+        <p:nvPr/>
+      </p:nvGrpSpPr>
+      <p:grpSpPr>
+        <a:xfrm>
+          <a:off x="0" y="0"/>
+          <a:ext cx="0" cy="0"/>
+          <a:chOff x="0" y="0"/>
+          <a:chExt cx="0" cy="0"/>
+        </a:xfrm>
+      </p:grpSpPr>
+      <p:sp>
+        <p:nvSpPr>
+          <p:cNvPr id="2" name="Title 1"/>
+          <p:cNvSpPr>
+            <a:spLocks noGrp="1"/>
+          </p:cNvSpPr>
+          <p:nvPr>
+            <p:ph type="title"/>
+          </p:nvPr>
+        </p:nvSpPr>
+        <p:spPr>
+          <a:xfrm>
+            <a:off x="838200" y="365125"/>
+            <a:ext cx="10515600" cy="477557"/>
+          </a:xfrm>
+        </p:spPr>
+        <p:txBody>
+          <a:bodyPr>
+            <a:normAutofit fontScale="90000"/>
+          </a:bodyPr>
+          <a:lstStyle/>
+          <a:p>
+            <a:pPr algn="ctr"/>
+            <a:r>
+              <a:rPr lang="en-US" dirty="0" smtClean="0"/>
+              <a:t>Week 20</a:t>
+            </a:r>
+            <a:endParaRPr lang="en-US" dirty="0"/>
+          </a:p>
+        </p:txBody>
+      </p:sp>
+      <p:pic>
+        <p:nvPicPr>
+          <p:cNvPr id="5" name="Content Placeholder 4"/>
+          <p:cNvPicPr>
+            <a:picLocks noGrp="1" noChangeAspect="1"/>
+          </p:cNvPicPr>
+          <p:nvPr>
+            <p:ph idx="1"/>
+          </p:nvPr>
+        </p:nvPicPr>
+        <p:blipFill>
+          <a:blip r:embed="rId2" cstate="print">
+            <a:extLst>
+              <a:ext uri="{28A0092B-C50C-407E-A947-70E740481C1C}">
+                <a14:useLocalDpi xmlns:a14="http://schemas.microsoft.com/office/drawing/2010/main" val="0"/>
+              </a:ext>
+            </a:extLst>
+          </a:blip>
+          <a:stretch>
+            <a:fillRect/>
+          </a:stretch>
+        </p:blipFill>
+        <p:spPr>
+          <a:xfrm>
+            <a:off x="227082" y="1549367"/>
+            <a:ext cx="3851877" cy="3209898"/>
+          </a:xfrm>
+        </p:spPr>
+      </p:pic>
+      <p:sp>
+        <p:nvSpPr>
+          <p:cNvPr id="4" name="Slide Number Placeholder 3"/>
+          <p:cNvSpPr>
+            <a:spLocks noGrp="1"/>
+          </p:cNvSpPr>
+          <p:nvPr>
+            <p:ph type="sldNum" sz="quarter" idx="12"/>
+          </p:nvPr>
+        </p:nvSpPr>
+        <p:spPr/>
+        <p:txBody>
+          <a:bodyPr/>
+          <a:lstStyle/>
+          <a:p>
+            <a:fld id="{C6028E65-7989-4318-8A09-D88C034A7CD7}" type="slidenum">
+              <a:rPr lang="en-US" smtClean="0"/>
+              <a:t>9</a:t>
+            </a:fld>
+            <a:endParaRPr lang="en-US"/>
+          </a:p>
+        </p:txBody>
+      </p:sp>
+      <p:pic>
+        <p:nvPicPr>
+          <p:cNvPr id="7" name="Picture 6"/>
+          <p:cNvPicPr>
+            <a:picLocks noChangeAspect="1"/>
+          </p:cNvPicPr>
+          <p:nvPr/>
+        </p:nvPicPr>
+        <p:blipFill>
+          <a:blip r:embed="rId3" cstate="print">
+            <a:extLst>
+              <a:ext uri="{28A0092B-C50C-407E-A947-70E740481C1C}">
+                <a14:useLocalDpi xmlns:a14="http://schemas.microsoft.com/office/drawing/2010/main" val="0"/>
+              </a:ext>
+            </a:extLst>
+          </a:blip>
+          <a:stretch>
+            <a:fillRect/>
+          </a:stretch>
+        </p:blipFill>
+        <p:spPr>
+          <a:xfrm>
+            <a:off x="4192502" y="1549367"/>
+            <a:ext cx="3851876" cy="3209896"/>
+          </a:xfrm>
+          <a:prstGeom prst="rect">
+            <a:avLst/>
+          </a:prstGeom>
+        </p:spPr>
+      </p:pic>
+      <p:pic>
+        <p:nvPicPr>
+          <p:cNvPr id="9" name="Picture 8"/>
+          <p:cNvPicPr>
+            <a:picLocks noChangeAspect="1"/>
+          </p:cNvPicPr>
+          <p:nvPr/>
+        </p:nvPicPr>
+        <p:blipFill>
+          <a:blip r:embed="rId4" cstate="print">
+            <a:extLst>
+              <a:ext uri="{28A0092B-C50C-407E-A947-70E740481C1C}">
+                <a14:useLocalDpi xmlns:a14="http://schemas.microsoft.com/office/drawing/2010/main" val="0"/>
+              </a:ext>
+            </a:extLst>
+          </a:blip>
+          <a:stretch>
+            <a:fillRect/>
+          </a:stretch>
+        </p:blipFill>
+        <p:spPr>
+          <a:xfrm>
+            <a:off x="8157920" y="1549367"/>
+            <a:ext cx="3851876" cy="3209896"/>
+          </a:xfrm>
+          <a:prstGeom prst="rect">
+            <a:avLst/>
+          </a:prstGeom>
+        </p:spPr>
+      </p:pic>
+      <p:pic>
+        <p:nvPicPr>
+          <p:cNvPr id="11" name="Picture 10"/>
+          <p:cNvPicPr>
+            <a:picLocks noChangeAspect="1"/>
+          </p:cNvPicPr>
+          <p:nvPr/>
+        </p:nvPicPr>
+        <p:blipFill>
+          <a:blip r:embed="rId5"/>
+          <a:stretch>
+            <a:fillRect/>
+          </a:stretch>
+        </p:blipFill>
+        <p:spPr>
+          <a:xfrm>
+            <a:off x="227082" y="5289178"/>
+            <a:ext cx="3851877" cy="700714"/>
+          </a:xfrm>
+          <a:prstGeom prst="rect">
+            <a:avLst/>
+          </a:prstGeom>
+        </p:spPr>
+      </p:pic>
+      <p:pic>
+        <p:nvPicPr>
+          <p:cNvPr id="12" name="Picture 11"/>
+          <p:cNvPicPr>
+            <a:picLocks noChangeAspect="1"/>
+          </p:cNvPicPr>
+          <p:nvPr/>
+        </p:nvPicPr>
+        <p:blipFill>
+          <a:blip r:embed="rId6"/>
+          <a:stretch>
+            <a:fillRect/>
+          </a:stretch>
+        </p:blipFill>
+        <p:spPr>
+          <a:xfrm>
+            <a:off x="4192503" y="5289179"/>
+            <a:ext cx="3851876" cy="700714"/>
+          </a:xfrm>
+          <a:prstGeom prst="rect">
+            <a:avLst/>
+          </a:prstGeom>
+        </p:spPr>
+      </p:pic>
+      <p:pic>
+        <p:nvPicPr>
+          <p:cNvPr id="13" name="Picture 12"/>
+          <p:cNvPicPr>
+            <a:picLocks noChangeAspect="1"/>
+          </p:cNvPicPr>
+          <p:nvPr/>
+        </p:nvPicPr>
+        <p:blipFill>
+          <a:blip r:embed="rId7"/>
+          <a:stretch>
+            <a:fillRect/>
+          </a:stretch>
+        </p:blipFill>
+        <p:spPr>
+          <a:xfrm>
+            <a:off x="8157921" y="5289179"/>
+            <a:ext cx="3851876" cy="700714"/>
+          </a:xfrm>
+          <a:prstGeom prst="rect">
+            <a:avLst/>
+          </a:prstGeom>
+        </p:spPr>
+      </p:pic>
+    </p:spTree>
+    <p:extLst>
+      <p:ext uri="{BB962C8B-B14F-4D97-AF65-F5344CB8AC3E}">
+        <p14:creationId xmlns:p14="http://schemas.microsoft.com/office/powerpoint/2010/main" val="2125176627"/>
       </p:ext>
     </p:extLst>
   </p:cSld>

</xml_diff>